<commit_message>
agregando descripcion sobre el testin
</commit_message>
<xml_diff>
--- a/Presentacion de Clase.pptx
+++ b/Presentacion de Clase.pptx
@@ -124,7 +124,7 @@
   </p:defaultTextStyle>
   <p:extLst>
     <p:ext uri="{EFAFB233-063F-42B5-8137-9DF3F51BA10A}">
-      <p15:sldGuideLst xmlns:p15="http://schemas.microsoft.com/office/powerpoint/2012/main"/>
+      <p15:sldGuideLst xmlns:p15="http://schemas.microsoft.com/office/powerpoint/2012/main" xmlns=""/>
     </p:ext>
   </p:extLst>
 </p:presentation>
@@ -7040,7 +7040,9 @@
         </p:nvSpPr>
         <p:spPr/>
         <p:txBody>
-          <a:bodyPr/>
+          <a:bodyPr>
+            <a:normAutofit/>
+          </a:bodyPr>
           <a:lstStyle/>
           <a:p>
             <a:pPr lvl="0"/>
@@ -7079,13 +7081,8 @@
             <a:pPr lvl="0"/>
             <a:r>
               <a:rPr lang="es-ES" dirty="0"/>
-              <a:t>Desarrollador</a:t>
-            </a:r>
-            <a:r>
-              <a:rPr lang="es-ES"/>
-              <a:t>: </a:t>
-            </a:r>
-            <a:endParaRPr lang="es-ES" dirty="0"/>
+              <a:t>Desarrollador: </a:t>
+            </a:r>
           </a:p>
           <a:p>
             <a:pPr lvl="0"/>
@@ -7100,6 +7097,82 @@
             <a:r>
               <a:rPr lang="es-ES" dirty="0" smtClean="0"/>
               <a:t>:</a:t>
+            </a:r>
+            <a:r>
+              <a:rPr lang="es-PY" dirty="0" smtClean="0"/>
+              <a:t>es el encargado de  planificar </a:t>
+            </a:r>
+            <a:r>
+              <a:rPr lang="es-PY" dirty="0"/>
+              <a:t>y </a:t>
+            </a:r>
+            <a:r>
+              <a:rPr lang="es-PY" dirty="0" smtClean="0"/>
+              <a:t>llevar </a:t>
+            </a:r>
+            <a:r>
+              <a:rPr lang="es-PY" dirty="0"/>
+              <a:t>a cabo </a:t>
+            </a:r>
+            <a:r>
+              <a:rPr lang="es-PY" dirty="0" smtClean="0"/>
+              <a:t>las pruebas del </a:t>
+            </a:r>
+            <a:r>
+              <a:rPr lang="es-PY" dirty="0"/>
+              <a:t>software </a:t>
+            </a:r>
+            <a:r>
+              <a:rPr lang="es-PY" dirty="0" smtClean="0"/>
+              <a:t>para </a:t>
+            </a:r>
+            <a:r>
+              <a:rPr lang="es-PY" dirty="0"/>
+              <a:t>comprobar si </a:t>
+            </a:r>
+            <a:r>
+              <a:rPr lang="es-PY" dirty="0" smtClean="0"/>
+              <a:t>funciona correctamente</a:t>
+            </a:r>
+            <a:r>
+              <a:rPr lang="es-PY" dirty="0"/>
+              <a:t>. </a:t>
+            </a:r>
+            <a:r>
+              <a:rPr lang="es-PY" dirty="0" smtClean="0"/>
+              <a:t>También identifican </a:t>
+            </a:r>
+            <a:r>
+              <a:rPr lang="es-PY" dirty="0"/>
+              <a:t>el riesgo de sufrir </a:t>
+            </a:r>
+            <a:r>
+              <a:rPr lang="es-PY" dirty="0" smtClean="0"/>
+              <a:t>errores en el mismo, </a:t>
+            </a:r>
+            <a:r>
+              <a:rPr lang="es-PY" dirty="0"/>
+              <a:t>detectan errores y los comunican. </a:t>
+            </a:r>
+            <a:r>
+              <a:rPr lang="es-PY" dirty="0" smtClean="0"/>
+              <a:t>Evalúa el </a:t>
+            </a:r>
+            <a:r>
+              <a:rPr lang="es-PY" dirty="0"/>
+              <a:t>funcionamiento general del </a:t>
+            </a:r>
+            <a:r>
+              <a:rPr lang="es-PY" dirty="0" smtClean="0"/>
+              <a:t>sistema y </a:t>
+            </a:r>
+            <a:r>
+              <a:rPr lang="es-PY" dirty="0"/>
+              <a:t>sugieren formas de </a:t>
+            </a:r>
+            <a:r>
+              <a:rPr lang="es-PY" dirty="0" smtClean="0"/>
+              <a:t>mejorarlo.</a:t>
             </a:r>
             <a:endParaRPr lang="es-ES" dirty="0"/>
           </a:p>
@@ -8572,11 +8645,11 @@
               <a:buNone/>
             </a:pPr>
             <a:r>
-              <a:rPr lang="es-419" b="1" dirty="0"/>
+              <a:rPr lang="x-none" b="1" dirty="0"/>
               <a:t>El sistema DeliverYApp permitirá realizar las siguientes </a:t>
             </a:r>
             <a:r>
-              <a:rPr lang="es-419" b="1" dirty="0" smtClean="0"/>
+              <a:rPr lang="x-none" b="1" dirty="0" smtClean="0"/>
               <a:t>funciones</a:t>
             </a:r>
             <a:r>
@@ -8764,10 +8837,9 @@
               <a:buNone/>
             </a:pPr>
             <a:r>
-              <a:rPr lang="es-419" sz="3000" b="1" dirty="0"/>
+              <a:rPr lang="x-none" sz="3000" b="1" dirty="0"/>
               <a:t>Características de los usuarios: </a:t>
             </a:r>
-            <a:endParaRPr lang="es-419" sz="3000" b="1" dirty="0"/>
           </a:p>
           <a:p>
             <a:pPr lvl="0"/>
@@ -9051,7 +9123,7 @@
     </a:clrScheme>
     <a:fontScheme name="Ion">
       <a:majorFont>
-        <a:latin typeface="Century Gothic" panose="020B0502020202020204"/>
+        <a:latin typeface="Century Gothic"/>
         <a:ea typeface=""/>
         <a:cs typeface=""/>
         <a:font script="Jpan" typeface="メイリオ"/>
@@ -9086,7 +9158,7 @@
         <a:font script="Geor" typeface="Sylfaen"/>
       </a:majorFont>
       <a:minorFont>
-        <a:latin typeface="Century Gothic" panose="020B0502020202020204"/>
+        <a:latin typeface="Century Gothic"/>
         <a:ea typeface=""/>
         <a:cs typeface=""/>
         <a:font script="Jpan" typeface="メイリオ"/>
@@ -9268,7 +9340,7 @@
   <a:extraClrSchemeLst/>
   <a:extLst>
     <a:ext uri="{05A4C25C-085E-4340-85A3-A5531E510DB2}">
-      <thm15:themeFamily xmlns:thm15="http://schemas.microsoft.com/office/thememl/2012/main" name="Ion" id="{B8441ADB-2E43-4AF7-B97A-BD870242C6A8}" vid="{292E63A9-BB86-4E3D-B92A-7223C6510D2E}"/>
+      <thm15:themeFamily xmlns:thm15="http://schemas.microsoft.com/office/thememl/2012/main" xmlns="" name="Ion" id="{B8441ADB-2E43-4AF7-B97A-BD870242C6A8}" vid="{292E63A9-BB86-4E3D-B92A-7223C6510D2E}"/>
     </a:ext>
   </a:extLst>
 </a:theme>

</xml_diff>

<commit_message>
sigo añadiendo diapositivas con descripciones del sistema
</commit_message>
<xml_diff>
--- a/Presentacion de Clase.pptx
+++ b/Presentacion de Clase.pptx
@@ -13,11 +13,17 @@
     <p:sldId id="268" r:id="rId7"/>
     <p:sldId id="266" r:id="rId8"/>
     <p:sldId id="267" r:id="rId9"/>
-    <p:sldId id="263" r:id="rId10"/>
-    <p:sldId id="264" r:id="rId11"/>
-    <p:sldId id="265" r:id="rId12"/>
-    <p:sldId id="259" r:id="rId13"/>
-    <p:sldId id="260" r:id="rId14"/>
+    <p:sldId id="272" r:id="rId10"/>
+    <p:sldId id="269" r:id="rId11"/>
+    <p:sldId id="270" r:id="rId12"/>
+    <p:sldId id="273" r:id="rId13"/>
+    <p:sldId id="274" r:id="rId14"/>
+    <p:sldId id="275" r:id="rId15"/>
+    <p:sldId id="263" r:id="rId16"/>
+    <p:sldId id="264" r:id="rId17"/>
+    <p:sldId id="265" r:id="rId18"/>
+    <p:sldId id="259" r:id="rId19"/>
+    <p:sldId id="260" r:id="rId20"/>
   </p:sldIdLst>
   <p:sldSz cx="12192000" cy="6858000"/>
   <p:notesSz cx="6858000" cy="9144000"/>
@@ -6168,6 +6174,582 @@
           <a:chExt cx="0" cy="0"/>
         </a:xfrm>
       </p:grpSpPr>
+      <p:sp>
+        <p:nvSpPr>
+          <p:cNvPr id="3" name="Marcador de contenido 2"/>
+          <p:cNvSpPr>
+            <a:spLocks noGrp="1"/>
+          </p:cNvSpPr>
+          <p:nvPr>
+            <p:ph idx="1"/>
+          </p:nvPr>
+        </p:nvSpPr>
+        <p:spPr>
+          <a:xfrm>
+            <a:off x="742703" y="958213"/>
+            <a:ext cx="10925556" cy="4669855"/>
+          </a:xfrm>
+        </p:spPr>
+        <p:txBody>
+          <a:bodyPr>
+            <a:normAutofit/>
+          </a:bodyPr>
+          <a:lstStyle/>
+          <a:p>
+            <a:pPr lvl="0"/>
+            <a:r>
+              <a:rPr lang="es-ES" b="1" dirty="0"/>
+              <a:t>Lenguaje de programación:</a:t>
+            </a:r>
+            <a:r>
+              <a:rPr lang="es-ES" dirty="0"/>
+              <a:t> Todo el material que se realice para el usuario y la aplicación debe estar en lenguaje español.</a:t>
+            </a:r>
+          </a:p>
+          <a:p>
+            <a:pPr lvl="0"/>
+            <a:r>
+              <a:rPr lang="es-ES" b="1" dirty="0"/>
+              <a:t>Protocolo de comunicación:</a:t>
+            </a:r>
+            <a:r>
+              <a:rPr lang="es-ES" dirty="0"/>
+              <a:t> Se usar los protocolos TCP/IP, HTTP.</a:t>
+            </a:r>
+          </a:p>
+          <a:p>
+            <a:pPr lvl="0"/>
+            <a:r>
+              <a:rPr lang="es-ES" b="1" dirty="0"/>
+              <a:t>Requisitos de habilidad: </a:t>
+            </a:r>
+            <a:r>
+              <a:rPr lang="es-ES" dirty="0"/>
+              <a:t>La información correspondiente al pedido como numero de documento, nombre, dirección, teléfono y elección de menú  deben estar ajustado a la realidad para evitar inconvenientes y garantizar el pedido. </a:t>
+            </a:r>
+          </a:p>
+          <a:p>
+            <a:pPr lvl="0"/>
+            <a:r>
+              <a:rPr lang="es-ES" b="1" dirty="0"/>
+              <a:t>Credibilidad en la aplicación: </a:t>
+            </a:r>
+            <a:r>
+              <a:rPr lang="es-ES" dirty="0"/>
+              <a:t>El sistema deberá ser sometida a una serie de pruebas para establecer que se encuentra conforme a los requerimiento que se plasman en el documento, en tanto en la consistencia de datos como el rendimiento de la aplicación, tales como tiempo de respuesta.</a:t>
+            </a:r>
+          </a:p>
+          <a:p>
+            <a:pPr lvl="0"/>
+            <a:r>
+              <a:rPr lang="es-ES" b="1" dirty="0"/>
+              <a:t>Consideración acerca de la seguridad: </a:t>
+            </a:r>
+            <a:r>
+              <a:rPr lang="es-ES" dirty="0"/>
+              <a:t>Cada Usuario deberá autenticarse y su acceso verificado por una sola terminal para su respectiva labor de acuerdo de lo que su labor especifica</a:t>
+            </a:r>
+            <a:r>
+              <a:rPr lang="es-ES" dirty="0" smtClean="0"/>
+              <a:t>.</a:t>
+            </a:r>
+            <a:endParaRPr lang="es-ES" dirty="0"/>
+          </a:p>
+          <a:p>
+            <a:endParaRPr lang="es-ES" dirty="0"/>
+          </a:p>
+        </p:txBody>
+      </p:sp>
+    </p:spTree>
+    <p:extLst>
+      <p:ext uri="{BB962C8B-B14F-4D97-AF65-F5344CB8AC3E}">
+        <p14:creationId xmlns:p14="http://schemas.microsoft.com/office/powerpoint/2010/main" val="3000362817"/>
+      </p:ext>
+    </p:extLst>
+  </p:cSld>
+  <p:clrMapOvr>
+    <a:masterClrMapping/>
+  </p:clrMapOvr>
+</p:sld>
+</file>
+
+<file path=ppt/slides/slide11.xml><?xml version="1.0" encoding="utf-8"?>
+<p:sld xmlns:a="http://schemas.openxmlformats.org/drawingml/2006/main" xmlns:r="http://schemas.openxmlformats.org/officeDocument/2006/relationships" xmlns:p="http://schemas.openxmlformats.org/presentationml/2006/main">
+  <p:cSld>
+    <p:spTree>
+      <p:nvGrpSpPr>
+        <p:cNvPr id="1" name=""/>
+        <p:cNvGrpSpPr/>
+        <p:nvPr/>
+      </p:nvGrpSpPr>
+      <p:grpSpPr>
+        <a:xfrm>
+          <a:off x="0" y="0"/>
+          <a:ext cx="0" cy="0"/>
+          <a:chOff x="0" y="0"/>
+          <a:chExt cx="0" cy="0"/>
+        </a:xfrm>
+      </p:grpSpPr>
+      <p:sp>
+        <p:nvSpPr>
+          <p:cNvPr id="2" name="Título 1"/>
+          <p:cNvSpPr>
+            <a:spLocks noGrp="1"/>
+          </p:cNvSpPr>
+          <p:nvPr>
+            <p:ph type="title"/>
+          </p:nvPr>
+        </p:nvSpPr>
+        <p:spPr>
+          <a:xfrm>
+            <a:off x="1103312" y="652388"/>
+            <a:ext cx="9404723" cy="854440"/>
+          </a:xfrm>
+        </p:spPr>
+        <p:txBody>
+          <a:bodyPr/>
+          <a:lstStyle/>
+          <a:p>
+            <a:r>
+              <a:rPr lang="es-ES" b="1" dirty="0"/>
+              <a:t>Suposiciones y Dependencias </a:t>
+            </a:r>
+            <a:endParaRPr lang="es-ES" dirty="0"/>
+          </a:p>
+        </p:txBody>
+      </p:sp>
+      <p:sp>
+        <p:nvSpPr>
+          <p:cNvPr id="3" name="Marcador de contenido 2"/>
+          <p:cNvSpPr>
+            <a:spLocks noGrp="1"/>
+          </p:cNvSpPr>
+          <p:nvPr>
+            <p:ph idx="1"/>
+          </p:nvPr>
+        </p:nvSpPr>
+        <p:spPr/>
+        <p:txBody>
+          <a:bodyPr/>
+          <a:lstStyle/>
+          <a:p>
+            <a:pPr lvl="0"/>
+            <a:r>
+              <a:rPr lang="es-ES" dirty="0"/>
+              <a:t>La red interna deberá estar configurada para el manejo de protocolos TCP/IP, HTTP, DNS principalmente todo lo relacionado a desempeño y seguridad</a:t>
+            </a:r>
+            <a:r>
+              <a:rPr lang="es-ES" dirty="0" smtClean="0"/>
+              <a:t>.</a:t>
+            </a:r>
+          </a:p>
+          <a:p>
+            <a:pPr lvl="0"/>
+            <a:endParaRPr lang="es-ES" dirty="0"/>
+          </a:p>
+          <a:p>
+            <a:pPr marL="0" lvl="0" indent="0">
+              <a:buNone/>
+            </a:pPr>
+            <a:endParaRPr lang="es-ES" dirty="0"/>
+          </a:p>
+          <a:p>
+            <a:pPr lvl="0"/>
+            <a:r>
+              <a:rPr lang="es-ES" dirty="0"/>
+              <a:t>Debe realzarse una capacitación adecuada y acorde a lo que cada usuario va a realizar. Su capacitación se hará en el momento que sea necesario y a las personas indicadas.</a:t>
+            </a:r>
+          </a:p>
+          <a:p>
+            <a:endParaRPr lang="es-ES" dirty="0"/>
+          </a:p>
+        </p:txBody>
+      </p:sp>
+    </p:spTree>
+    <p:extLst>
+      <p:ext uri="{BB962C8B-B14F-4D97-AF65-F5344CB8AC3E}">
+        <p14:creationId xmlns:p14="http://schemas.microsoft.com/office/powerpoint/2010/main" val="2695191375"/>
+      </p:ext>
+    </p:extLst>
+  </p:cSld>
+  <p:clrMapOvr>
+    <a:masterClrMapping/>
+  </p:clrMapOvr>
+</p:sld>
+</file>
+
+<file path=ppt/slides/slide12.xml><?xml version="1.0" encoding="utf-8"?>
+<p:sld xmlns:a="http://schemas.openxmlformats.org/drawingml/2006/main" xmlns:r="http://schemas.openxmlformats.org/officeDocument/2006/relationships" xmlns:p="http://schemas.openxmlformats.org/presentationml/2006/main">
+  <p:cSld>
+    <p:spTree>
+      <p:nvGrpSpPr>
+        <p:cNvPr id="1" name=""/>
+        <p:cNvGrpSpPr/>
+        <p:nvPr/>
+      </p:nvGrpSpPr>
+      <p:grpSpPr>
+        <a:xfrm>
+          <a:off x="0" y="0"/>
+          <a:ext cx="0" cy="0"/>
+          <a:chOff x="0" y="0"/>
+          <a:chExt cx="0" cy="0"/>
+        </a:xfrm>
+      </p:grpSpPr>
+      <p:sp>
+        <p:nvSpPr>
+          <p:cNvPr id="2" name="Título 1"/>
+          <p:cNvSpPr>
+            <a:spLocks noGrp="1"/>
+          </p:cNvSpPr>
+          <p:nvPr>
+            <p:ph type="title"/>
+          </p:nvPr>
+        </p:nvSpPr>
+        <p:spPr/>
+        <p:txBody>
+          <a:bodyPr/>
+          <a:lstStyle/>
+          <a:p>
+            <a:endParaRPr lang="es-ES"/>
+          </a:p>
+        </p:txBody>
+      </p:sp>
+      <p:sp>
+        <p:nvSpPr>
+          <p:cNvPr id="3" name="Marcador de contenido 2"/>
+          <p:cNvSpPr>
+            <a:spLocks noGrp="1"/>
+          </p:cNvSpPr>
+          <p:nvPr>
+            <p:ph idx="1"/>
+          </p:nvPr>
+        </p:nvSpPr>
+        <p:spPr/>
+        <p:txBody>
+          <a:bodyPr/>
+          <a:lstStyle/>
+          <a:p>
+            <a:endParaRPr lang="es-ES"/>
+          </a:p>
+        </p:txBody>
+      </p:sp>
+    </p:spTree>
+    <p:extLst>
+      <p:ext uri="{BB962C8B-B14F-4D97-AF65-F5344CB8AC3E}">
+        <p14:creationId xmlns:p14="http://schemas.microsoft.com/office/powerpoint/2010/main" val="2249228712"/>
+      </p:ext>
+    </p:extLst>
+  </p:cSld>
+  <p:clrMapOvr>
+    <a:masterClrMapping/>
+  </p:clrMapOvr>
+</p:sld>
+</file>
+
+<file path=ppt/slides/slide13.xml><?xml version="1.0" encoding="utf-8"?>
+<p:sld xmlns:a="http://schemas.openxmlformats.org/drawingml/2006/main" xmlns:r="http://schemas.openxmlformats.org/officeDocument/2006/relationships" xmlns:p="http://schemas.openxmlformats.org/presentationml/2006/main">
+  <p:cSld>
+    <p:spTree>
+      <p:nvGrpSpPr>
+        <p:cNvPr id="1" name=""/>
+        <p:cNvGrpSpPr/>
+        <p:nvPr/>
+      </p:nvGrpSpPr>
+      <p:grpSpPr>
+        <a:xfrm>
+          <a:off x="0" y="0"/>
+          <a:ext cx="0" cy="0"/>
+          <a:chOff x="0" y="0"/>
+          <a:chExt cx="0" cy="0"/>
+        </a:xfrm>
+      </p:grpSpPr>
+      <p:sp>
+        <p:nvSpPr>
+          <p:cNvPr id="2" name="Título 1"/>
+          <p:cNvSpPr>
+            <a:spLocks noGrp="1"/>
+          </p:cNvSpPr>
+          <p:nvPr>
+            <p:ph type="title"/>
+          </p:nvPr>
+        </p:nvSpPr>
+        <p:spPr/>
+        <p:txBody>
+          <a:bodyPr/>
+          <a:lstStyle/>
+          <a:p>
+            <a:endParaRPr lang="es-ES"/>
+          </a:p>
+        </p:txBody>
+      </p:sp>
+      <p:sp>
+        <p:nvSpPr>
+          <p:cNvPr id="3" name="Marcador de contenido 2"/>
+          <p:cNvSpPr>
+            <a:spLocks noGrp="1"/>
+          </p:cNvSpPr>
+          <p:nvPr>
+            <p:ph idx="1"/>
+          </p:nvPr>
+        </p:nvSpPr>
+        <p:spPr/>
+        <p:txBody>
+          <a:bodyPr/>
+          <a:lstStyle/>
+          <a:p>
+            <a:endParaRPr lang="es-ES"/>
+          </a:p>
+        </p:txBody>
+      </p:sp>
+    </p:spTree>
+    <p:extLst>
+      <p:ext uri="{BB962C8B-B14F-4D97-AF65-F5344CB8AC3E}">
+        <p14:creationId xmlns:p14="http://schemas.microsoft.com/office/powerpoint/2010/main" val="2246452530"/>
+      </p:ext>
+    </p:extLst>
+  </p:cSld>
+  <p:clrMapOvr>
+    <a:masterClrMapping/>
+  </p:clrMapOvr>
+</p:sld>
+</file>
+
+<file path=ppt/slides/slide14.xml><?xml version="1.0" encoding="utf-8"?>
+<p:sld xmlns:a="http://schemas.openxmlformats.org/drawingml/2006/main" xmlns:r="http://schemas.openxmlformats.org/officeDocument/2006/relationships" xmlns:p="http://schemas.openxmlformats.org/presentationml/2006/main">
+  <p:cSld>
+    <p:spTree>
+      <p:nvGrpSpPr>
+        <p:cNvPr id="1" name=""/>
+        <p:cNvGrpSpPr/>
+        <p:nvPr/>
+      </p:nvGrpSpPr>
+      <p:grpSpPr>
+        <a:xfrm>
+          <a:off x="0" y="0"/>
+          <a:ext cx="0" cy="0"/>
+          <a:chOff x="0" y="0"/>
+          <a:chExt cx="0" cy="0"/>
+        </a:xfrm>
+      </p:grpSpPr>
+      <p:sp>
+        <p:nvSpPr>
+          <p:cNvPr id="2" name="Título 1"/>
+          <p:cNvSpPr>
+            <a:spLocks noGrp="1"/>
+          </p:cNvSpPr>
+          <p:nvPr>
+            <p:ph type="title"/>
+          </p:nvPr>
+        </p:nvSpPr>
+        <p:spPr/>
+        <p:txBody>
+          <a:bodyPr/>
+          <a:lstStyle/>
+          <a:p>
+            <a:pPr lvl="0"/>
+            <a:r>
+              <a:rPr lang="es-ES" b="1" dirty="0"/>
+              <a:t>Requisitos Específicos</a:t>
+            </a:r>
+            <a:r>
+              <a:rPr lang="es-ES" dirty="0"/>
+              <a:t/>
+            </a:r>
+            <a:br>
+              <a:rPr lang="es-ES" dirty="0"/>
+            </a:br>
+            <a:endParaRPr lang="es-ES" dirty="0"/>
+          </a:p>
+        </p:txBody>
+      </p:sp>
+      <p:sp>
+        <p:nvSpPr>
+          <p:cNvPr id="3" name="Marcador de contenido 2"/>
+          <p:cNvSpPr>
+            <a:spLocks noGrp="1"/>
+          </p:cNvSpPr>
+          <p:nvPr>
+            <p:ph idx="1"/>
+          </p:nvPr>
+        </p:nvSpPr>
+        <p:spPr>
+          <a:xfrm>
+            <a:off x="646111" y="1434732"/>
+            <a:ext cx="8946541" cy="4195481"/>
+          </a:xfrm>
+        </p:spPr>
+        <p:txBody>
+          <a:bodyPr/>
+          <a:lstStyle/>
+          <a:p>
+            <a:pPr marL="457200" lvl="1" indent="0">
+              <a:buNone/>
+            </a:pPr>
+            <a:r>
+              <a:rPr lang="es-ES" sz="2000" b="1" dirty="0"/>
+              <a:t>I</a:t>
+            </a:r>
+            <a:r>
+              <a:rPr lang="es-ES" sz="2000" b="1" dirty="0" smtClean="0"/>
+              <a:t>nterfaces </a:t>
+            </a:r>
+            <a:r>
+              <a:rPr lang="es-ES" sz="2000" b="1" dirty="0"/>
+              <a:t>Externas </a:t>
+            </a:r>
+            <a:endParaRPr lang="es-ES" sz="2000" dirty="0"/>
+          </a:p>
+          <a:p>
+            <a:r>
+              <a:rPr lang="es-ES" dirty="0"/>
+              <a:t>El sistema </a:t>
+            </a:r>
+            <a:r>
+              <a:rPr lang="es-ES" dirty="0" err="1"/>
+              <a:t>DeliverYApp</a:t>
+            </a:r>
+            <a:r>
+              <a:rPr lang="es-ES" dirty="0"/>
+              <a:t> no tendrá interconexión con otros sistemas informáticos por lo tanto no es necesario la utilización de interfaces específicas para este punto.</a:t>
+            </a:r>
+          </a:p>
+          <a:p>
+            <a:endParaRPr lang="es-ES" dirty="0"/>
+          </a:p>
+        </p:txBody>
+      </p:sp>
+    </p:spTree>
+    <p:extLst>
+      <p:ext uri="{BB962C8B-B14F-4D97-AF65-F5344CB8AC3E}">
+        <p14:creationId xmlns:p14="http://schemas.microsoft.com/office/powerpoint/2010/main" val="3035906080"/>
+      </p:ext>
+    </p:extLst>
+  </p:cSld>
+  <p:clrMapOvr>
+    <a:masterClrMapping/>
+  </p:clrMapOvr>
+</p:sld>
+</file>
+
+<file path=ppt/slides/slide15.xml><?xml version="1.0" encoding="utf-8"?>
+<p:sld xmlns:a="http://schemas.openxmlformats.org/drawingml/2006/main" xmlns:r="http://schemas.openxmlformats.org/officeDocument/2006/relationships" xmlns:p="http://schemas.openxmlformats.org/presentationml/2006/main">
+  <p:cSld>
+    <p:spTree>
+      <p:nvGrpSpPr>
+        <p:cNvPr id="1" name=""/>
+        <p:cNvGrpSpPr/>
+        <p:nvPr/>
+      </p:nvGrpSpPr>
+      <p:grpSpPr>
+        <a:xfrm>
+          <a:off x="0" y="0"/>
+          <a:ext cx="0" cy="0"/>
+          <a:chOff x="0" y="0"/>
+          <a:chExt cx="0" cy="0"/>
+        </a:xfrm>
+      </p:grpSpPr>
+      <p:sp>
+        <p:nvSpPr>
+          <p:cNvPr id="2" name="Título 1"/>
+          <p:cNvSpPr>
+            <a:spLocks noGrp="1"/>
+          </p:cNvSpPr>
+          <p:nvPr>
+            <p:ph type="title"/>
+          </p:nvPr>
+        </p:nvSpPr>
+        <p:spPr>
+          <a:xfrm>
+            <a:off x="787520" y="1148176"/>
+            <a:ext cx="10689465" cy="1157141"/>
+          </a:xfrm>
+        </p:spPr>
+        <p:txBody>
+          <a:bodyPr/>
+          <a:lstStyle/>
+          <a:p>
+            <a:r>
+              <a:rPr lang="es-ES" b="1" dirty="0"/>
+              <a:t>Definiciones, acrónimos y abreviaturas</a:t>
+            </a:r>
+            <a:endParaRPr lang="es-ES" dirty="0"/>
+          </a:p>
+        </p:txBody>
+      </p:sp>
+      <p:pic>
+        <p:nvPicPr>
+          <p:cNvPr id="4" name="Marcador de contenido 3"/>
+          <p:cNvPicPr>
+            <a:picLocks noGrp="1" noChangeAspect="1"/>
+          </p:cNvPicPr>
+          <p:nvPr>
+            <p:ph idx="1"/>
+          </p:nvPr>
+        </p:nvPicPr>
+        <p:blipFill rotWithShape="1">
+          <a:blip r:embed="rId2"/>
+          <a:srcRect l="27195" t="26141" r="10498" b="26192"/>
+          <a:stretch/>
+        </p:blipFill>
+        <p:spPr>
+          <a:xfrm>
+            <a:off x="1822567" y="2343952"/>
+            <a:ext cx="8361793" cy="3580327"/>
+          </a:xfrm>
+          <a:prstGeom prst="rect">
+            <a:avLst/>
+          </a:prstGeom>
+          <a:ln w="228600" cap="sq" cmpd="thickThin">
+            <a:solidFill>
+              <a:srgbClr val="000000"/>
+            </a:solidFill>
+            <a:prstDash val="solid"/>
+            <a:miter lim="800000"/>
+          </a:ln>
+          <a:effectLst>
+            <a:innerShdw blurRad="76200">
+              <a:srgbClr val="000000"/>
+            </a:innerShdw>
+          </a:effectLst>
+        </p:spPr>
+      </p:pic>
+    </p:spTree>
+    <p:extLst>
+      <p:ext uri="{BB962C8B-B14F-4D97-AF65-F5344CB8AC3E}">
+        <p14:creationId xmlns:p14="http://schemas.microsoft.com/office/powerpoint/2010/main" val="1364109173"/>
+      </p:ext>
+    </p:extLst>
+  </p:cSld>
+  <p:clrMapOvr>
+    <a:masterClrMapping/>
+  </p:clrMapOvr>
+  <p:timing>
+    <p:tnLst>
+      <p:par>
+        <p:cTn id="1" dur="indefinite" restart="never" nodeType="tmRoot"/>
+      </p:par>
+    </p:tnLst>
+  </p:timing>
+</p:sld>
+</file>
+
+<file path=ppt/slides/slide16.xml><?xml version="1.0" encoding="utf-8"?>
+<p:sld xmlns:a="http://schemas.openxmlformats.org/drawingml/2006/main" xmlns:r="http://schemas.openxmlformats.org/officeDocument/2006/relationships" xmlns:p="http://schemas.openxmlformats.org/presentationml/2006/main">
+  <p:cSld>
+    <p:spTree>
+      <p:nvGrpSpPr>
+        <p:cNvPr id="1" name=""/>
+        <p:cNvGrpSpPr/>
+        <p:nvPr/>
+      </p:nvGrpSpPr>
+      <p:grpSpPr>
+        <a:xfrm>
+          <a:off x="0" y="0"/>
+          <a:ext cx="0" cy="0"/>
+          <a:chOff x="0" y="0"/>
+          <a:chExt cx="0" cy="0"/>
+        </a:xfrm>
+      </p:grpSpPr>
       <p:pic>
         <p:nvPicPr>
           <p:cNvPr id="4" name="Marcador de contenido 3"/>
@@ -6225,7 +6807,7 @@
 </p:sld>
 </file>
 
-<file path=ppt/slides/slide11.xml><?xml version="1.0" encoding="utf-8"?>
+<file path=ppt/slides/slide17.xml><?xml version="1.0" encoding="utf-8"?>
 <p:sld xmlns:a="http://schemas.openxmlformats.org/drawingml/2006/main" xmlns:r="http://schemas.openxmlformats.org/officeDocument/2006/relationships" xmlns:p="http://schemas.openxmlformats.org/presentationml/2006/main">
   <p:cSld>
     <p:spTree>
@@ -6340,7 +6922,7 @@
 </p:sld>
 </file>
 
-<file path=ppt/slides/slide12.xml><?xml version="1.0" encoding="utf-8"?>
+<file path=ppt/slides/slide18.xml><?xml version="1.0" encoding="utf-8"?>
 <p:sld xmlns:a="http://schemas.openxmlformats.org/drawingml/2006/main" xmlns:r="http://schemas.openxmlformats.org/officeDocument/2006/relationships" xmlns:p="http://schemas.openxmlformats.org/presentationml/2006/main">
   <p:cSld>
     <p:spTree>
@@ -6403,7 +6985,7 @@
 </p:sld>
 </file>
 
-<file path=ppt/slides/slide13.xml><?xml version="1.0" encoding="utf-8"?>
+<file path=ppt/slides/slide19.xml><?xml version="1.0" encoding="utf-8"?>
 <p:sld xmlns:a="http://schemas.openxmlformats.org/drawingml/2006/main" xmlns:r="http://schemas.openxmlformats.org/officeDocument/2006/relationships" xmlns:p="http://schemas.openxmlformats.org/presentationml/2006/main">
   <p:cSld>
     <p:spTree>
@@ -6596,30 +7178,6 @@
               <a:t>DeliverYapp</a:t>
             </a:r>
             <a:endParaRPr lang="es-ES" sz="9600" dirty="0"/>
-          </a:p>
-        </p:txBody>
-      </p:sp>
-      <p:sp>
-        <p:nvSpPr>
-          <p:cNvPr id="3" name="Marcador de contenido 2"/>
-          <p:cNvSpPr>
-            <a:spLocks noGrp="1"/>
-          </p:cNvSpPr>
-          <p:nvPr>
-            <p:ph idx="1"/>
-          </p:nvPr>
-        </p:nvSpPr>
-        <p:spPr>
-          <a:xfrm>
-            <a:off x="1133341" y="4790941"/>
-            <a:ext cx="8916512" cy="1457458"/>
-          </a:xfrm>
-        </p:spPr>
-        <p:txBody>
-          <a:bodyPr/>
-          <a:lstStyle/>
-          <a:p>
-            <a:endParaRPr lang="es-ES" dirty="0"/>
           </a:p>
         </p:txBody>
       </p:sp>
@@ -7776,26 +8334,43 @@
         </p:nvSpPr>
         <p:spPr>
           <a:xfrm>
-            <a:off x="1219221" y="2306644"/>
-            <a:ext cx="9663427" cy="4158551"/>
+            <a:off x="1174144" y="2113461"/>
+            <a:ext cx="8542965" cy="3630517"/>
           </a:xfrm>
         </p:spPr>
         <p:txBody>
           <a:bodyPr>
-            <a:normAutofit/>
+            <a:normAutofit lnSpcReduction="10000"/>
           </a:bodyPr>
           <a:lstStyle/>
           <a:p>
-            <a:r>
-              <a:rPr lang="es-ES" sz="3600" dirty="0"/>
-              <a:t>El sistema </a:t>
-            </a:r>
-            <a:r>
-              <a:rPr lang="es-ES" sz="3600" dirty="0" err="1"/>
+            <a:pPr marL="0" indent="0">
+              <a:buNone/>
+            </a:pPr>
+            <a:r>
+              <a:rPr lang="es-ES" sz="3200" b="1" dirty="0"/>
+              <a:t>Perspectiva del producto</a:t>
+            </a:r>
+            <a:endParaRPr lang="es-ES" sz="3200" dirty="0" smtClean="0"/>
+          </a:p>
+          <a:p>
+            <a:pPr marL="0" indent="0">
+              <a:buNone/>
+            </a:pPr>
+            <a:r>
+              <a:rPr lang="es-ES" sz="3200" dirty="0" smtClean="0"/>
+              <a:t>El </a:t>
+            </a:r>
+            <a:r>
+              <a:rPr lang="es-ES" sz="3200" dirty="0"/>
+              <a:t>sistema </a:t>
+            </a:r>
+            <a:r>
+              <a:rPr lang="es-ES" sz="3200" dirty="0" err="1"/>
               <a:t>DeliverYApp</a:t>
             </a:r>
             <a:r>
-              <a:rPr lang="es-ES" sz="3600" dirty="0"/>
+              <a:rPr lang="es-ES" sz="3200" dirty="0"/>
               <a:t> será un producto diseñado para trabajar en entornos web, lo que permitirá su utilización de forma descentralizada, además trabajará de manera independiente por lo tanto no interactuará con otro sistemas.</a:t>
             </a:r>
           </a:p>
@@ -7814,7 +8389,7 @@
         </p:nvSpPr>
         <p:spPr>
           <a:xfrm>
-            <a:off x="646111" y="358713"/>
+            <a:off x="1174144" y="929780"/>
             <a:ext cx="9404723" cy="629107"/>
           </a:xfrm>
           <a:prstGeom prst="rect">
@@ -7913,113 +8488,6 @@
           </a:p>
         </p:txBody>
       </p:sp>
-      <p:sp>
-        <p:nvSpPr>
-          <p:cNvPr id="8" name="Título 1"/>
-          <p:cNvSpPr txBox="1">
-            <a:spLocks/>
-          </p:cNvSpPr>
-          <p:nvPr/>
-        </p:nvSpPr>
-        <p:spPr>
-          <a:xfrm>
-            <a:off x="646111" y="1442953"/>
-            <a:ext cx="9251303" cy="408557"/>
-          </a:xfrm>
-          <a:prstGeom prst="rect">
-            <a:avLst/>
-          </a:prstGeom>
-        </p:spPr>
-        <p:txBody>
-          <a:bodyPr vert="horz" lIns="91440" tIns="45720" rIns="91440" bIns="45720" rtlCol="0" anchor="t">
-            <a:noAutofit/>
-          </a:bodyPr>
-          <a:lstStyle>
-            <a:lvl1pPr algn="l" defTabSz="457200" rtl="0" eaLnBrk="1" latinLnBrk="0" hangingPunct="1">
-              <a:spcBef>
-                <a:spcPct val="0"/>
-              </a:spcBef>
-              <a:buNone/>
-              <a:defRPr sz="4200" b="0" i="0" kern="1200">
-                <a:solidFill>
-                  <a:schemeClr val="tx2"/>
-                </a:solidFill>
-                <a:latin typeface="+mj-lt"/>
-                <a:ea typeface="+mj-ea"/>
-                <a:cs typeface="+mj-cs"/>
-              </a:defRPr>
-            </a:lvl1pPr>
-            <a:lvl2pPr eaLnBrk="1" hangingPunct="1">
-              <a:defRPr>
-                <a:solidFill>
-                  <a:schemeClr val="tx2"/>
-                </a:solidFill>
-              </a:defRPr>
-            </a:lvl2pPr>
-            <a:lvl3pPr eaLnBrk="1" hangingPunct="1">
-              <a:defRPr>
-                <a:solidFill>
-                  <a:schemeClr val="tx2"/>
-                </a:solidFill>
-              </a:defRPr>
-            </a:lvl3pPr>
-            <a:lvl4pPr eaLnBrk="1" hangingPunct="1">
-              <a:defRPr>
-                <a:solidFill>
-                  <a:schemeClr val="tx2"/>
-                </a:solidFill>
-              </a:defRPr>
-            </a:lvl4pPr>
-            <a:lvl5pPr eaLnBrk="1" hangingPunct="1">
-              <a:defRPr>
-                <a:solidFill>
-                  <a:schemeClr val="tx2"/>
-                </a:solidFill>
-              </a:defRPr>
-            </a:lvl5pPr>
-            <a:lvl6pPr eaLnBrk="1" hangingPunct="1">
-              <a:defRPr>
-                <a:solidFill>
-                  <a:schemeClr val="tx2"/>
-                </a:solidFill>
-              </a:defRPr>
-            </a:lvl6pPr>
-            <a:lvl7pPr eaLnBrk="1" hangingPunct="1">
-              <a:defRPr>
-                <a:solidFill>
-                  <a:schemeClr val="tx2"/>
-                </a:solidFill>
-              </a:defRPr>
-            </a:lvl7pPr>
-            <a:lvl8pPr eaLnBrk="1" hangingPunct="1">
-              <a:defRPr>
-                <a:solidFill>
-                  <a:schemeClr val="tx2"/>
-                </a:solidFill>
-              </a:defRPr>
-            </a:lvl8pPr>
-            <a:lvl9pPr eaLnBrk="1" hangingPunct="1">
-              <a:defRPr>
-                <a:solidFill>
-                  <a:schemeClr val="tx2"/>
-                </a:solidFill>
-              </a:defRPr>
-            </a:lvl9pPr>
-          </a:lstStyle>
-          <a:p>
-            <a:pPr lvl="1"/>
-            <a:r>
-              <a:rPr lang="es-ES" sz="4800" b="1" dirty="0"/>
-              <a:t>Perspectiva del </a:t>
-            </a:r>
-            <a:r>
-              <a:rPr lang="es-ES" sz="4800" b="1" dirty="0" smtClean="0"/>
-              <a:t>producto</a:t>
-            </a:r>
-            <a:endParaRPr lang="es-ES" sz="4800" dirty="0"/>
-          </a:p>
-        </p:txBody>
-      </p:sp>
     </p:spTree>
     <p:extLst>
       <p:ext uri="{BB962C8B-B14F-4D97-AF65-F5344CB8AC3E}">
@@ -8060,12 +8528,21 @@
             <p:ph type="title"/>
           </p:nvPr>
         </p:nvSpPr>
-        <p:spPr/>
+        <p:spPr>
+          <a:xfrm>
+            <a:off x="695460" y="388323"/>
+            <a:ext cx="9406890" cy="693502"/>
+          </a:xfrm>
+        </p:spPr>
         <p:txBody>
           <a:bodyPr/>
           <a:lstStyle/>
           <a:p>
-            <a:endParaRPr lang="es-ES"/>
+            <a:r>
+              <a:rPr lang="es-ES" b="1" dirty="0"/>
+              <a:t>Funciones del Producto</a:t>
+            </a:r>
+            <a:endParaRPr lang="es-ES" dirty="0"/>
           </a:p>
         </p:txBody>
       </p:sp>
@@ -8079,12 +8556,157 @@
             <p:ph idx="1"/>
           </p:nvPr>
         </p:nvSpPr>
-        <p:spPr/>
-        <p:txBody>
-          <a:bodyPr/>
+        <p:spPr>
+          <a:xfrm>
+            <a:off x="695460" y="1313645"/>
+            <a:ext cx="10805375" cy="5267459"/>
+          </a:xfrm>
+        </p:spPr>
+        <p:txBody>
+          <a:bodyPr>
+            <a:normAutofit lnSpcReduction="10000"/>
+          </a:bodyPr>
           <a:lstStyle/>
           <a:p>
-            <a:endParaRPr lang="es-ES"/>
+            <a:pPr marL="0" indent="0">
+              <a:buNone/>
+            </a:pPr>
+            <a:r>
+              <a:rPr lang="es-419" b="1" dirty="0"/>
+              <a:t>El sistema DeliverYApp permitirá realizar las siguientes </a:t>
+            </a:r>
+            <a:r>
+              <a:rPr lang="es-419" b="1" dirty="0" smtClean="0"/>
+              <a:t>funciones</a:t>
+            </a:r>
+            <a:r>
+              <a:rPr lang="es-ES" b="1" dirty="0" smtClean="0"/>
+              <a:t>:</a:t>
+            </a:r>
+          </a:p>
+          <a:p>
+            <a:pPr lvl="0"/>
+            <a:r>
+              <a:rPr lang="es-ES" b="1" dirty="0"/>
+              <a:t>Registro de Empresa (</a:t>
+            </a:r>
+            <a:r>
+              <a:rPr lang="es-ES" b="1" dirty="0" err="1"/>
+              <a:t>Login</a:t>
+            </a:r>
+            <a:r>
+              <a:rPr lang="es-ES" b="1" dirty="0"/>
+              <a:t> - Empresa):</a:t>
+            </a:r>
+            <a:r>
+              <a:rPr lang="es-ES" dirty="0"/>
+              <a:t> Se le proveerá de un usuario y contraseña para que pueda acceder  y tener control de los servicios que provee el sistema. </a:t>
+            </a:r>
+            <a:endParaRPr lang="es-ES" dirty="0" smtClean="0"/>
+          </a:p>
+          <a:p>
+            <a:r>
+              <a:rPr lang="es-ES" b="1" dirty="0"/>
+              <a:t>Gestión de roles:</a:t>
+            </a:r>
+            <a:r>
+              <a:rPr lang="es-ES" dirty="0"/>
+              <a:t> Se especificará los niveles de accesos del sistema. </a:t>
+            </a:r>
+          </a:p>
+          <a:p>
+            <a:r>
+              <a:rPr lang="es-ES" b="1" dirty="0"/>
+              <a:t>Gestión de usuario:</a:t>
+            </a:r>
+            <a:r>
+              <a:rPr lang="es-ES" dirty="0"/>
+              <a:t> Se crearan los diferentes usuarios del sistema indicando sus roles.</a:t>
+            </a:r>
+          </a:p>
+          <a:p>
+            <a:r>
+              <a:rPr lang="es-ES" b="1" dirty="0"/>
+              <a:t>Gestión de menú:</a:t>
+            </a:r>
+            <a:r>
+              <a:rPr lang="es-ES" dirty="0"/>
+              <a:t> Este contendrá un formulario para el registro de los datos del producto, platos, precios, foto, etc.</a:t>
+            </a:r>
+          </a:p>
+          <a:p>
+            <a:r>
+              <a:rPr lang="es-ES" b="1" dirty="0"/>
+              <a:t>Gestión de pedidos:</a:t>
+            </a:r>
+            <a:r>
+              <a:rPr lang="es-ES" dirty="0"/>
+              <a:t> Este contendrá opciones para manejar los estados de los pedidos</a:t>
+            </a:r>
+            <a:r>
+              <a:rPr lang="es-ES" dirty="0" smtClean="0"/>
+              <a:t>.</a:t>
+            </a:r>
+          </a:p>
+          <a:p>
+            <a:r>
+              <a:rPr lang="es-ES" b="1" dirty="0"/>
+              <a:t>Gestión de informes</a:t>
+            </a:r>
+            <a:r>
+              <a:rPr lang="es-ES" dirty="0"/>
+              <a:t>: Este contendrá opción para generar informes estadísticos</a:t>
+            </a:r>
+            <a:r>
+              <a:rPr lang="es-ES" dirty="0" smtClean="0"/>
+              <a:t>.</a:t>
+            </a:r>
+          </a:p>
+          <a:p>
+            <a:pPr lvl="0"/>
+            <a:r>
+              <a:rPr lang="es-ES" b="1" dirty="0"/>
+              <a:t>Registro de cliente (</a:t>
+            </a:r>
+            <a:r>
+              <a:rPr lang="es-ES" b="1" dirty="0" err="1"/>
+              <a:t>Login</a:t>
+            </a:r>
+            <a:r>
+              <a:rPr lang="es-ES" b="1" dirty="0"/>
+              <a:t> - cliente):</a:t>
+            </a:r>
+            <a:r>
+              <a:rPr lang="es-ES" dirty="0"/>
+              <a:t> El cliente deberá registrarse antes de solicitar el pedido.</a:t>
+            </a:r>
+          </a:p>
+          <a:p>
+            <a:pPr lvl="0"/>
+            <a:r>
+              <a:rPr lang="es-ES" b="1" dirty="0"/>
+              <a:t>Elección y confirmación del pedido:</a:t>
+            </a:r>
+            <a:r>
+              <a:rPr lang="es-ES" dirty="0"/>
+              <a:t> Este contendrá opciones de elección de los diferentes tipos de platos que a su vez deberá ser confirmado.</a:t>
+            </a:r>
+          </a:p>
+          <a:p>
+            <a:endParaRPr lang="es-ES" dirty="0"/>
+          </a:p>
+          <a:p>
+            <a:pPr lvl="0"/>
+            <a:endParaRPr lang="es-ES" dirty="0"/>
+          </a:p>
+          <a:p>
+            <a:endParaRPr lang="es-ES" b="1" dirty="0" smtClean="0"/>
+          </a:p>
+          <a:p>
+            <a:pPr marL="0" indent="0">
+              <a:buNone/>
+            </a:pPr>
+            <a:endParaRPr lang="es-ES" b="1" dirty="0"/>
           </a:p>
         </p:txBody>
       </p:sp>
@@ -8120,39 +8742,68 @@
       </p:grpSpPr>
       <p:sp>
         <p:nvSpPr>
-          <p:cNvPr id="2" name="Título 1"/>
-          <p:cNvSpPr>
-            <a:spLocks noGrp="1"/>
-          </p:cNvSpPr>
-          <p:nvPr>
-            <p:ph type="title"/>
-          </p:nvPr>
-        </p:nvSpPr>
-        <p:spPr/>
+          <p:cNvPr id="3" name="Marcador de contenido 2"/>
+          <p:cNvSpPr>
+            <a:spLocks noGrp="1"/>
+          </p:cNvSpPr>
+          <p:nvPr>
+            <p:ph idx="1"/>
+          </p:nvPr>
+        </p:nvSpPr>
+        <p:spPr>
+          <a:xfrm>
+            <a:off x="859595" y="958214"/>
+            <a:ext cx="9971538" cy="5197888"/>
+          </a:xfrm>
+        </p:spPr>
         <p:txBody>
           <a:bodyPr/>
           <a:lstStyle/>
           <a:p>
-            <a:endParaRPr lang="es-ES"/>
-          </a:p>
-        </p:txBody>
-      </p:sp>
-      <p:sp>
-        <p:nvSpPr>
-          <p:cNvPr id="3" name="Marcador de contenido 2"/>
-          <p:cNvSpPr>
-            <a:spLocks noGrp="1"/>
-          </p:cNvSpPr>
-          <p:nvPr>
-            <p:ph idx="1"/>
-          </p:nvPr>
-        </p:nvSpPr>
-        <p:spPr/>
-        <p:txBody>
-          <a:bodyPr/>
-          <a:lstStyle/>
-          <a:p>
-            <a:endParaRPr lang="es-ES"/>
+            <a:pPr marL="0" indent="0">
+              <a:buNone/>
+            </a:pPr>
+            <a:r>
+              <a:rPr lang="es-419" sz="3000" b="1" dirty="0"/>
+              <a:t>Características de los usuarios: </a:t>
+            </a:r>
+            <a:endParaRPr lang="es-419" sz="3000" b="1" dirty="0"/>
+          </a:p>
+          <a:p>
+            <a:pPr lvl="0"/>
+            <a:r>
+              <a:rPr lang="es-ES" b="1" dirty="0"/>
+              <a:t>Administrador del sistema:</a:t>
+            </a:r>
+            <a:r>
+              <a:rPr lang="es-ES" dirty="0"/>
+              <a:t> usuario con gran conocimiento en el manejo del sistema, con una previa capacitación por parte de la entidad.</a:t>
+            </a:r>
+          </a:p>
+          <a:p>
+            <a:pPr lvl="0"/>
+            <a:r>
+              <a:rPr lang="es-ES" b="1" dirty="0"/>
+              <a:t>Usuario del sistema: </a:t>
+            </a:r>
+            <a:r>
+              <a:rPr lang="es-ES" dirty="0"/>
+              <a:t>es el encargado de gestionar los pedidos, con una previa capacitación por parte de la entidad.</a:t>
+            </a:r>
+          </a:p>
+          <a:p>
+            <a:pPr lvl="0"/>
+            <a:r>
+              <a:rPr lang="es-ES" b="1" dirty="0"/>
+              <a:t>Cliente:</a:t>
+            </a:r>
+            <a:r>
+              <a:rPr lang="es-ES" dirty="0"/>
+              <a:t> usuario visitante que solita los pedidos, debe contar con un conocimiento básico sobre el manejo de páginas web.</a:t>
+            </a:r>
+          </a:p>
+          <a:p>
+            <a:endParaRPr lang="es-ES" dirty="0"/>
           </a:p>
         </p:txBody>
       </p:sp>
@@ -8196,78 +8847,164 @@
             <p:ph type="title"/>
           </p:nvPr>
         </p:nvSpPr>
+        <p:spPr/>
+        <p:txBody>
+          <a:bodyPr/>
+          <a:lstStyle/>
+          <a:p>
+            <a:r>
+              <a:rPr lang="es-ES" dirty="0" smtClean="0"/>
+              <a:t>Restricciones</a:t>
+            </a:r>
+            <a:endParaRPr lang="es-ES" dirty="0"/>
+          </a:p>
+        </p:txBody>
+      </p:sp>
+      <p:sp>
+        <p:nvSpPr>
+          <p:cNvPr id="3" name="Marcador de contenido 2"/>
+          <p:cNvSpPr>
+            <a:spLocks noGrp="1"/>
+          </p:cNvSpPr>
+          <p:nvPr>
+            <p:ph idx="1"/>
+          </p:nvPr>
+        </p:nvSpPr>
         <p:spPr>
           <a:xfrm>
-            <a:off x="787520" y="1148176"/>
-            <a:ext cx="10689465" cy="1157141"/>
+            <a:off x="308531" y="1254427"/>
+            <a:ext cx="11153667" cy="5391071"/>
           </a:xfrm>
         </p:spPr>
         <p:txBody>
-          <a:bodyPr/>
+          <a:bodyPr>
+            <a:normAutofit/>
+          </a:bodyPr>
           <a:lstStyle/>
           <a:p>
-            <a:r>
-              <a:rPr lang="es-ES" b="1" dirty="0"/>
-              <a:t>Definiciones, acrónimos y abreviaturas</a:t>
-            </a:r>
+            <a:pPr lvl="0"/>
+            <a:r>
+              <a:rPr lang="es-ES" sz="1900" b="1" dirty="0"/>
+              <a:t>Políticas de la empresa:</a:t>
+            </a:r>
+            <a:r>
+              <a:rPr lang="es-ES" sz="1900" dirty="0"/>
+              <a:t> La aplicación se desarrollara mediante software de licencia abierta por lo tanto no se deberá pagar por el uso del servidor web(apache), sistema de gestión de base de datos (</a:t>
+            </a:r>
+            <a:r>
+              <a:rPr lang="es-ES" sz="1900" dirty="0" err="1"/>
+              <a:t>MySQL</a:t>
+            </a:r>
+            <a:r>
+              <a:rPr lang="es-ES" sz="1900" dirty="0"/>
+              <a:t>) y el lenguaje de programación </a:t>
+            </a:r>
+            <a:r>
+              <a:rPr lang="es-ES" sz="1900" dirty="0" err="1"/>
+              <a:t>RoR</a:t>
+            </a:r>
+            <a:r>
+              <a:rPr lang="es-ES" sz="1900" dirty="0"/>
+              <a:t>, por lo tanto la utilización de estos programas se harán mediantes las políticas establecidas por este tipo de licenciamiento</a:t>
+            </a:r>
+            <a:r>
+              <a:rPr lang="es-ES" sz="1900" dirty="0" smtClean="0"/>
+              <a:t>.</a:t>
+            </a:r>
+          </a:p>
+          <a:p>
+            <a:r>
+              <a:rPr lang="es-ES" sz="1900" b="1" dirty="0"/>
+              <a:t>Limitaciones del hardware:</a:t>
+            </a:r>
+            <a:r>
+              <a:rPr lang="es-ES" sz="1900" dirty="0"/>
+              <a:t> para esta aplicación será necesaria un computador servidor en el cual se instalara el servidor web apache, </a:t>
+            </a:r>
+            <a:r>
+              <a:rPr lang="es-ES" sz="1900" dirty="0" err="1"/>
+              <a:t>MySQl</a:t>
+            </a:r>
+            <a:r>
+              <a:rPr lang="es-ES" sz="1900" dirty="0"/>
+              <a:t>, </a:t>
+            </a:r>
+            <a:r>
+              <a:rPr lang="es-ES" sz="1900" dirty="0" err="1"/>
+              <a:t>RoR</a:t>
+            </a:r>
+            <a:r>
+              <a:rPr lang="es-ES" sz="1900" dirty="0"/>
+              <a:t> y la aplicación </a:t>
+            </a:r>
+            <a:r>
+              <a:rPr lang="es-ES" sz="1900" dirty="0" err="1"/>
+              <a:t>DeliverYApp</a:t>
+            </a:r>
+            <a:r>
+              <a:rPr lang="es-ES" sz="1900" dirty="0"/>
+              <a:t>.</a:t>
+            </a:r>
+          </a:p>
+          <a:p>
+            <a:r>
+              <a:rPr lang="es-ES" sz="1900" b="1" dirty="0"/>
+              <a:t>Interfaces con otras aplicaciones:</a:t>
+            </a:r>
+            <a:r>
+              <a:rPr lang="es-ES" sz="1900" dirty="0"/>
+              <a:t> Debido a que el sistema no interactúa con otro sistema y es autónomo no se desarrollaran interfaces con otras aplicaciones. Las conexiones necesarias para la utilización del servidor web, </a:t>
+            </a:r>
+            <a:r>
+              <a:rPr lang="es-ES" sz="1900" dirty="0" err="1"/>
+              <a:t>MySQL</a:t>
+            </a:r>
+            <a:r>
+              <a:rPr lang="es-ES" sz="1900" dirty="0"/>
+              <a:t>, </a:t>
+            </a:r>
+            <a:r>
+              <a:rPr lang="es-ES" sz="1900" dirty="0" err="1"/>
+              <a:t>RoR</a:t>
+            </a:r>
+            <a:r>
+              <a:rPr lang="es-ES" sz="1900" dirty="0"/>
+              <a:t> y un DNS será por medio de la configuración de estos programas.</a:t>
+            </a:r>
+          </a:p>
+          <a:p>
+            <a:r>
+              <a:rPr lang="es-ES" sz="1900" b="1" dirty="0"/>
+              <a:t>Funciones de control:</a:t>
+            </a:r>
+            <a:r>
+              <a:rPr lang="es-ES" sz="1900" dirty="0"/>
+              <a:t> El sistema debe controlar los permisos que tiene los usuarios para su accesibilidad de una manera correcta, de tal forma que pueda acceder la información que le corresponde de acuerdo a su rol. Debe tener controles adecuados para la validación de datos</a:t>
+            </a:r>
+            <a:r>
+              <a:rPr lang="es-ES" sz="1900" dirty="0" smtClean="0"/>
+              <a:t>.</a:t>
+            </a:r>
+          </a:p>
+          <a:p>
+            <a:pPr lvl="0"/>
             <a:endParaRPr lang="es-ES" dirty="0"/>
           </a:p>
-        </p:txBody>
-      </p:sp>
-      <p:pic>
-        <p:nvPicPr>
-          <p:cNvPr id="4" name="Marcador de contenido 3"/>
-          <p:cNvPicPr>
-            <a:picLocks noGrp="1" noChangeAspect="1"/>
-          </p:cNvPicPr>
-          <p:nvPr>
-            <p:ph idx="1"/>
-          </p:nvPr>
-        </p:nvPicPr>
-        <p:blipFill rotWithShape="1">
-          <a:blip r:embed="rId2"/>
-          <a:srcRect l="27195" t="26141" r="10498" b="26192"/>
-          <a:stretch/>
-        </p:blipFill>
-        <p:spPr>
-          <a:xfrm>
-            <a:off x="1822567" y="2343952"/>
-            <a:ext cx="8361793" cy="3580327"/>
-          </a:xfrm>
-          <a:prstGeom prst="rect">
-            <a:avLst/>
-          </a:prstGeom>
-          <a:ln w="228600" cap="sq" cmpd="thickThin">
-            <a:solidFill>
-              <a:srgbClr val="000000"/>
-            </a:solidFill>
-            <a:prstDash val="solid"/>
-            <a:miter lim="800000"/>
-          </a:ln>
-          <a:effectLst>
-            <a:innerShdw blurRad="76200">
-              <a:srgbClr val="000000"/>
-            </a:innerShdw>
-          </a:effectLst>
-        </p:spPr>
-      </p:pic>
+          <a:p>
+            <a:endParaRPr lang="es-ES" dirty="0"/>
+          </a:p>
+        </p:txBody>
+      </p:sp>
     </p:spTree>
     <p:extLst>
       <p:ext uri="{BB962C8B-B14F-4D97-AF65-F5344CB8AC3E}">
-        <p14:creationId xmlns:p14="http://schemas.microsoft.com/office/powerpoint/2010/main" val="1364109173"/>
+        <p14:creationId xmlns:p14="http://schemas.microsoft.com/office/powerpoint/2010/main" val="480829632"/>
       </p:ext>
     </p:extLst>
   </p:cSld>
   <p:clrMapOvr>
     <a:masterClrMapping/>
   </p:clrMapOvr>
-  <p:timing>
-    <p:tnLst>
-      <p:par>
-        <p:cTn id="1" dur="indefinite" restart="never" nodeType="tmRoot"/>
-      </p:par>
-    </p:tnLst>
-  </p:timing>
 </p:sld>
 </file>
 

</xml_diff>

<commit_message>
Le quite parte del texto.
</commit_message>
<xml_diff>
--- a/Presentacion de Clase.pptx
+++ b/Presentacion de Clase.pptx
@@ -14,20 +14,18 @@
     <p:sldId id="266" r:id="rId8"/>
     <p:sldId id="267" r:id="rId9"/>
     <p:sldId id="272" r:id="rId10"/>
-    <p:sldId id="269" r:id="rId11"/>
-    <p:sldId id="270" r:id="rId12"/>
-    <p:sldId id="275" r:id="rId13"/>
-    <p:sldId id="273" r:id="rId14"/>
-    <p:sldId id="274" r:id="rId15"/>
-    <p:sldId id="263" r:id="rId16"/>
-    <p:sldId id="264" r:id="rId17"/>
-    <p:sldId id="265" r:id="rId18"/>
-    <p:sldId id="259" r:id="rId19"/>
-    <p:sldId id="260" r:id="rId20"/>
-    <p:sldId id="276" r:id="rId21"/>
-    <p:sldId id="277" r:id="rId22"/>
-    <p:sldId id="278" r:id="rId23"/>
-    <p:sldId id="279" r:id="rId24"/>
+    <p:sldId id="270" r:id="rId11"/>
+    <p:sldId id="275" r:id="rId12"/>
+    <p:sldId id="273" r:id="rId13"/>
+    <p:sldId id="263" r:id="rId14"/>
+    <p:sldId id="264" r:id="rId15"/>
+    <p:sldId id="265" r:id="rId16"/>
+    <p:sldId id="259" r:id="rId17"/>
+    <p:sldId id="260" r:id="rId18"/>
+    <p:sldId id="276" r:id="rId19"/>
+    <p:sldId id="277" r:id="rId20"/>
+    <p:sldId id="278" r:id="rId21"/>
+    <p:sldId id="279" r:id="rId22"/>
   </p:sldIdLst>
   <p:sldSz cx="12192000" cy="6858000"/>
   <p:notesSz cx="6858000" cy="9144000"/>
@@ -128,7 +126,7 @@
   </p:defaultTextStyle>
   <p:extLst>
     <p:ext uri="{EFAFB233-063F-42B5-8137-9DF3F51BA10A}">
-      <p15:sldGuideLst xmlns:p15="http://schemas.microsoft.com/office/powerpoint/2012/main">
+      <p15:sldGuideLst xmlns:p15="http://schemas.microsoft.com/office/powerpoint/2012/main" xmlns="">
         <p15:guide id="1" orient="horz" pos="2160">
           <p15:clr>
             <a:srgbClr val="A4A3A4"/>
@@ -6191,84 +6189,82 @@
       </p:grpSpPr>
       <p:sp>
         <p:nvSpPr>
-          <p:cNvPr id="3" name="Marcador de contenido 2"/>
-          <p:cNvSpPr>
-            <a:spLocks noGrp="1"/>
-          </p:cNvSpPr>
-          <p:nvPr>
-            <p:ph idx="1"/>
+          <p:cNvPr id="2" name="Título 1"/>
+          <p:cNvSpPr>
+            <a:spLocks noGrp="1"/>
+          </p:cNvSpPr>
+          <p:nvPr>
+            <p:ph type="title"/>
           </p:nvPr>
         </p:nvSpPr>
         <p:spPr>
           <a:xfrm>
-            <a:off x="742703" y="958213"/>
-            <a:ext cx="10925556" cy="4669855"/>
+            <a:off x="1103312" y="665267"/>
+            <a:ext cx="9404723" cy="854440"/>
           </a:xfrm>
         </p:spPr>
         <p:txBody>
-          <a:bodyPr>
-            <a:normAutofit/>
-          </a:bodyPr>
+          <a:bodyPr/>
           <a:lstStyle/>
           <a:p>
-            <a:pPr lvl="0"/>
+            <a:pPr algn="ctr"/>
             <a:r>
               <a:rPr lang="es-ES" b="1" dirty="0"/>
-              <a:t>Lenguaje de programación:</a:t>
-            </a:r>
+              <a:t>Suposiciones y Dependencias </a:t>
+            </a:r>
+            <a:endParaRPr lang="es-ES" dirty="0"/>
+          </a:p>
+        </p:txBody>
+      </p:sp>
+      <p:sp>
+        <p:nvSpPr>
+          <p:cNvPr id="3" name="Marcador de contenido 2"/>
+          <p:cNvSpPr>
+            <a:spLocks noGrp="1"/>
+          </p:cNvSpPr>
+          <p:nvPr>
+            <p:ph idx="1"/>
+          </p:nvPr>
+        </p:nvSpPr>
+        <p:spPr/>
+        <p:txBody>
+          <a:bodyPr/>
+          <a:lstStyle/>
+          <a:p>
+            <a:pPr lvl="0" algn="just"/>
             <a:r>
               <a:rPr lang="es-ES" dirty="0"/>
-              <a:t> Todo el material que se realice para el usuario y la aplicación debe estar en lenguaje español.</a:t>
-            </a:r>
-          </a:p>
-          <a:p>
-            <a:pPr lvl="0"/>
-            <a:r>
-              <a:rPr lang="es-ES" b="1" dirty="0"/>
-              <a:t>Protocolo de comunicación:</a:t>
-            </a:r>
-            <a:r>
-              <a:rPr lang="es-ES" dirty="0"/>
-              <a:t> Se usar los protocolos TCP/IP, HTTP.</a:t>
-            </a:r>
-          </a:p>
-          <a:p>
-            <a:pPr lvl="0"/>
-            <a:r>
-              <a:rPr lang="es-ES" b="1" dirty="0"/>
-              <a:t>Requisitos de habilidad: </a:t>
-            </a:r>
-            <a:r>
-              <a:rPr lang="es-ES" dirty="0"/>
-              <a:t>La información correspondiente al pedido como numero de documento, nombre, dirección, teléfono y elección de menú  deben estar ajustado a la realidad para evitar inconvenientes y garantizar el pedido. </a:t>
-            </a:r>
-          </a:p>
-          <a:p>
-            <a:pPr lvl="0"/>
-            <a:r>
-              <a:rPr lang="es-ES" b="1" dirty="0"/>
-              <a:t>Credibilidad en la aplicación: </a:t>
-            </a:r>
-            <a:r>
-              <a:rPr lang="es-ES" dirty="0"/>
-              <a:t>El sistema deberá ser sometida a una serie de pruebas para establecer que se encuentra conforme a los requerimiento que se plasman en el documento, en tanto en la consistencia de datos como el rendimiento de la aplicación, tales como tiempo de respuesta.</a:t>
-            </a:r>
-          </a:p>
-          <a:p>
-            <a:pPr lvl="0"/>
-            <a:r>
-              <a:rPr lang="es-ES" b="1" dirty="0"/>
-              <a:t>Consideración acerca de la seguridad: </a:t>
-            </a:r>
-            <a:r>
-              <a:rPr lang="es-ES" dirty="0"/>
-              <a:t>Cada Usuario deberá autenticarse y su acceso verificado por una sola terminal para su respectiva labor de acuerdo de lo que su labor especifica</a:t>
+              <a:t>La red interna deberá estar configurada para el manejo de protocolos TCP/IP, HTTP, DNS principalmente todo lo relacionado a desempeño y seguridad</a:t>
             </a:r>
             <a:r>
               <a:rPr lang="es-ES" dirty="0" smtClean="0"/>
               <a:t>.</a:t>
             </a:r>
+          </a:p>
+          <a:p>
+            <a:pPr lvl="0" algn="just"/>
             <a:endParaRPr lang="es-ES" dirty="0"/>
+          </a:p>
+          <a:p>
+            <a:pPr marL="0" lvl="0" indent="0" algn="just">
+              <a:buNone/>
+            </a:pPr>
+            <a:endParaRPr lang="es-ES" dirty="0"/>
+          </a:p>
+          <a:p>
+            <a:pPr lvl="0" algn="just"/>
+            <a:r>
+              <a:rPr lang="es-ES" dirty="0"/>
+              <a:t>Debe </a:t>
+            </a:r>
+            <a:r>
+              <a:rPr lang="es-ES" dirty="0" smtClean="0"/>
+              <a:t>realizarse </a:t>
+            </a:r>
+            <a:r>
+              <a:rPr lang="es-ES" dirty="0"/>
+              <a:t>una capacitación adecuada y acorde a lo que cada usuario va a realizar. Su capacitación se hará en el momento que sea necesario y a las personas indicadas.</a:t>
+            </a:r>
           </a:p>
           <a:p>
             <a:endParaRPr lang="es-ES" dirty="0"/>
@@ -6278,7 +6274,7 @@
     </p:spTree>
     <p:extLst>
       <p:ext uri="{BB962C8B-B14F-4D97-AF65-F5344CB8AC3E}">
-        <p14:creationId xmlns:p14="http://schemas.microsoft.com/office/powerpoint/2010/main" val="3000362817"/>
+        <p14:creationId xmlns:p14="http://schemas.microsoft.com/office/powerpoint/2010/main" val="2695191375"/>
       </p:ext>
     </p:extLst>
   </p:cSld>
@@ -6322,65 +6318,107 @@
             <p:ph type="title"/>
           </p:nvPr>
         </p:nvSpPr>
+        <p:spPr/>
+        <p:txBody>
+          <a:bodyPr/>
+          <a:lstStyle/>
+          <a:p>
+            <a:pPr lvl="0" algn="ctr"/>
+            <a:r>
+              <a:rPr lang="es-ES" b="1" dirty="0"/>
+              <a:t>Requisitos Específicos</a:t>
+            </a:r>
+            <a:r>
+              <a:rPr lang="es-ES" dirty="0"/>
+              <a:t/>
+            </a:r>
+            <a:br>
+              <a:rPr lang="es-ES" dirty="0"/>
+            </a:br>
+            <a:endParaRPr lang="es-ES" dirty="0"/>
+          </a:p>
+        </p:txBody>
+      </p:sp>
+      <p:sp>
+        <p:nvSpPr>
+          <p:cNvPr id="3" name="Marcador de contenido 2"/>
+          <p:cNvSpPr>
+            <a:spLocks noGrp="1"/>
+          </p:cNvSpPr>
+          <p:nvPr>
+            <p:ph idx="1"/>
+          </p:nvPr>
+        </p:nvSpPr>
         <p:spPr>
           <a:xfrm>
-            <a:off x="1103312" y="652388"/>
-            <a:ext cx="9404723" cy="854440"/>
+            <a:off x="1249251" y="2040038"/>
+            <a:ext cx="8718997" cy="4077426"/>
           </a:xfrm>
         </p:spPr>
         <p:txBody>
-          <a:bodyPr/>
+          <a:bodyPr>
+            <a:normAutofit/>
+          </a:bodyPr>
           <a:lstStyle/>
           <a:p>
+            <a:pPr marL="457200" lvl="1" indent="0" algn="ctr">
+              <a:buNone/>
+            </a:pPr>
+            <a:r>
+              <a:rPr lang="es-ES" sz="2000" b="1" dirty="0"/>
+              <a:t>I</a:t>
+            </a:r>
+            <a:r>
+              <a:rPr lang="es-ES" sz="2000" b="1" dirty="0" smtClean="0"/>
+              <a:t>nterfaces </a:t>
+            </a:r>
+            <a:r>
+              <a:rPr lang="es-ES" sz="2000" b="1" dirty="0"/>
+              <a:t>Externas </a:t>
+            </a:r>
+            <a:r>
+              <a:rPr lang="es-ES" sz="2000" dirty="0"/>
+              <a:t>	</a:t>
+            </a:r>
+            <a:endParaRPr lang="es-ES" sz="2000" dirty="0" smtClean="0"/>
+          </a:p>
+          <a:p>
+            <a:pPr marL="457200" lvl="1" indent="0" algn="ctr">
+              <a:buNone/>
+            </a:pPr>
+            <a:r>
+              <a:rPr lang="es-ES" b="1" dirty="0" smtClean="0"/>
+              <a:t>Funciones </a:t>
+            </a:r>
             <a:r>
               <a:rPr lang="es-ES" b="1" dirty="0"/>
-              <a:t>Suposiciones y Dependencias </a:t>
-            </a:r>
-            <a:endParaRPr lang="es-ES" dirty="0"/>
-          </a:p>
-        </p:txBody>
-      </p:sp>
-      <p:sp>
-        <p:nvSpPr>
-          <p:cNvPr id="3" name="Marcador de contenido 2"/>
-          <p:cNvSpPr>
-            <a:spLocks noGrp="1"/>
-          </p:cNvSpPr>
-          <p:nvPr>
-            <p:ph idx="1"/>
-          </p:nvPr>
-        </p:nvSpPr>
-        <p:spPr/>
-        <p:txBody>
-          <a:bodyPr/>
-          <a:lstStyle/>
-          <a:p>
-            <a:pPr lvl="0"/>
-            <a:r>
-              <a:rPr lang="es-ES" dirty="0"/>
-              <a:t>La red interna deberá estar configurada para el manejo de protocolos TCP/IP, HTTP, DNS principalmente todo lo relacionado a desempeño y seguridad</a:t>
-            </a:r>
-            <a:r>
-              <a:rPr lang="es-ES" dirty="0" smtClean="0"/>
-              <a:t>.</a:t>
-            </a:r>
-          </a:p>
-          <a:p>
-            <a:pPr lvl="0"/>
-            <a:endParaRPr lang="es-ES" dirty="0"/>
+              <a:t>del Sistema</a:t>
+            </a:r>
+            <a:endParaRPr lang="es-ES" sz="1600" dirty="0"/>
+          </a:p>
+          <a:p>
+            <a:pPr marL="0" lvl="0" indent="0" algn="ctr">
+              <a:buNone/>
+            </a:pPr>
+            <a:r>
+              <a:rPr lang="es-ES" b="1" dirty="0"/>
+              <a:t>	</a:t>
+            </a:r>
+            <a:r>
+              <a:rPr lang="es-ES" b="1" dirty="0" smtClean="0"/>
+              <a:t>Rendimiento </a:t>
+            </a:r>
+            <a:r>
+              <a:rPr lang="es-ES" b="1" dirty="0"/>
+              <a:t>del sistema</a:t>
+            </a:r>
+            <a:endParaRPr lang="es-ES" sz="1600" dirty="0"/>
           </a:p>
           <a:p>
             <a:pPr marL="0" lvl="0" indent="0">
               <a:buNone/>
             </a:pPr>
             <a:endParaRPr lang="es-ES" dirty="0"/>
-          </a:p>
-          <a:p>
-            <a:pPr lvl="0"/>
-            <a:r>
-              <a:rPr lang="es-ES" dirty="0"/>
-              <a:t>Debe realzarse una capacitación adecuada y acorde a lo que cada usuario va a realizar. Su capacitación se hará en el momento que sea necesario y a las personas indicadas.</a:t>
-            </a:r>
           </a:p>
           <a:p>
             <a:endParaRPr lang="es-ES" dirty="0"/>
@@ -6390,7 +6428,7 @@
     </p:spTree>
     <p:extLst>
       <p:ext uri="{BB962C8B-B14F-4D97-AF65-F5344CB8AC3E}">
-        <p14:creationId xmlns:p14="http://schemas.microsoft.com/office/powerpoint/2010/main" val="2695191375"/>
+        <p14:creationId xmlns:p14="http://schemas.microsoft.com/office/powerpoint/2010/main" val="3035906080"/>
       </p:ext>
     </p:extLst>
   </p:cSld>
@@ -6426,181 +6464,126 @@
       </p:grpSpPr>
       <p:sp>
         <p:nvSpPr>
-          <p:cNvPr id="2" name="Título 1"/>
-          <p:cNvSpPr>
-            <a:spLocks noGrp="1"/>
-          </p:cNvSpPr>
-          <p:nvPr>
-            <p:ph type="title"/>
-          </p:nvPr>
-        </p:nvSpPr>
-        <p:spPr/>
+          <p:cNvPr id="5" name="Título 1"/>
+          <p:cNvSpPr>
+            <a:spLocks noGrp="1"/>
+          </p:cNvSpPr>
+          <p:nvPr>
+            <p:ph idx="1"/>
+          </p:nvPr>
+        </p:nvSpPr>
+        <p:spPr>
+          <a:xfrm>
+            <a:off x="412124" y="334851"/>
+            <a:ext cx="11449318" cy="6117464"/>
+          </a:xfrm>
+        </p:spPr>
         <p:txBody>
           <a:bodyPr/>
           <a:lstStyle/>
           <a:p>
+            <a:pPr marL="457200" lvl="1" indent="0" algn="ctr">
+              <a:buNone/>
+            </a:pPr>
+            <a:r>
+              <a:rPr lang="es-ES" sz="2000" b="1" dirty="0"/>
+              <a:t>Requerimientos lógicos del sistema de base de datos</a:t>
+            </a:r>
+          </a:p>
+          <a:p>
             <a:pPr lvl="0"/>
             <a:r>
-              <a:rPr lang="es-ES" b="1" dirty="0"/>
-              <a:t>Requisitos Específicos</a:t>
-            </a:r>
-            <a:r>
               <a:rPr lang="es-ES" dirty="0"/>
-              <a:t/>
-            </a:r>
-            <a:br>
+              <a:t>El sistema debe permitir la retención de datos para guardar un registro de ellos para posterior reportes.</a:t>
+            </a:r>
+          </a:p>
+          <a:p>
+            <a:pPr lvl="0"/>
+            <a:r>
               <a:rPr lang="es-ES" dirty="0"/>
-            </a:br>
+              <a:t>El sistema debe tener en cuenta que información solo puede ser eliminada y cual es de gran importancia.</a:t>
+            </a:r>
+          </a:p>
+          <a:p>
+            <a:pPr lvl="0"/>
+            <a:r>
+              <a:rPr lang="es-ES" dirty="0"/>
+              <a:t>La infraestructura debe ser capaz de soportar estos procedimientos</a:t>
+            </a:r>
+            <a:r>
+              <a:rPr lang="es-ES" dirty="0" smtClean="0"/>
+              <a:t>.</a:t>
+            </a:r>
+          </a:p>
+          <a:p>
+            <a:pPr marL="0" lvl="0" indent="0">
+              <a:buNone/>
+            </a:pPr>
             <a:endParaRPr lang="es-ES" dirty="0"/>
           </a:p>
-        </p:txBody>
-      </p:sp>
-      <p:sp>
-        <p:nvSpPr>
-          <p:cNvPr id="3" name="Marcador de contenido 2"/>
-          <p:cNvSpPr>
-            <a:spLocks noGrp="1"/>
-          </p:cNvSpPr>
-          <p:nvPr>
-            <p:ph idx="1"/>
-          </p:nvPr>
-        </p:nvSpPr>
-        <p:spPr>
-          <a:xfrm>
-            <a:off x="646111" y="1434732"/>
-            <a:ext cx="11292604" cy="5236524"/>
-          </a:xfrm>
-        </p:spPr>
-        <p:txBody>
-          <a:bodyPr>
-            <a:normAutofit/>
-          </a:bodyPr>
-          <a:lstStyle/>
-          <a:p>
-            <a:pPr marL="457200" lvl="1" indent="0">
+          <a:p>
+            <a:pPr marL="457200" lvl="1" indent="0" algn="ctr">
               <a:buNone/>
             </a:pPr>
             <a:r>
               <a:rPr lang="es-ES" sz="2000" b="1" dirty="0"/>
-              <a:t>I</a:t>
-            </a:r>
-            <a:r>
-              <a:rPr lang="es-ES" sz="2000" b="1" dirty="0" smtClean="0"/>
-              <a:t>nterfaces </a:t>
-            </a:r>
-            <a:r>
-              <a:rPr lang="es-ES" sz="2000" b="1" dirty="0"/>
-              <a:t>Externas </a:t>
-            </a:r>
-            <a:endParaRPr lang="es-ES" sz="2000" dirty="0"/>
-          </a:p>
-          <a:p>
+              <a:t>Propiedades emergentes del Sistema</a:t>
+            </a:r>
+          </a:p>
+          <a:p>
+            <a:pPr lvl="0" algn="just"/>
             <a:r>
               <a:rPr lang="es-ES" dirty="0"/>
-              <a:t>El sistema </a:t>
-            </a:r>
-            <a:r>
-              <a:rPr lang="es-ES" dirty="0" err="1"/>
-              <a:t>DeliverYApp</a:t>
+              <a:t>Seguridad</a:t>
+            </a:r>
+            <a:r>
+              <a:rPr lang="es-ES" dirty="0" smtClean="0"/>
+              <a:t>:</a:t>
+            </a:r>
+          </a:p>
+          <a:p>
+            <a:pPr marL="0" lvl="0" indent="0" algn="just">
+              <a:buNone/>
+            </a:pPr>
+            <a:r>
+              <a:rPr lang="es-ES" dirty="0" smtClean="0"/>
+              <a:t> </a:t>
             </a:r>
             <a:r>
               <a:rPr lang="es-ES" dirty="0"/>
-              <a:t> no tendrá interconexión con otros sistemas informáticos por lo tanto no es necesario la utilización de interfaces específicas para este </a:t>
+              <a:t>será por medio de un usuario y una contraseña, el encargado de la </a:t>
             </a:r>
             <a:r>
               <a:rPr lang="es-ES" dirty="0" smtClean="0"/>
-              <a:t>punto.</a:t>
-            </a:r>
-          </a:p>
-          <a:p>
-            <a:pPr marL="0" indent="0">
-              <a:buNone/>
-            </a:pPr>
-            <a:r>
-              <a:rPr lang="es-ES" b="1" dirty="0" smtClean="0"/>
-              <a:t>   	Funciones </a:t>
-            </a:r>
-            <a:r>
-              <a:rPr lang="es-ES" b="1" dirty="0"/>
-              <a:t>del Sistema</a:t>
-            </a:r>
-            <a:endParaRPr lang="es-ES" sz="1600" dirty="0"/>
-          </a:p>
-          <a:p>
-            <a:pPr lvl="0"/>
+              <a:t>asignación </a:t>
+            </a:r>
             <a:r>
               <a:rPr lang="es-ES" dirty="0"/>
-              <a:t>El cliente primeramente deberá registrarse para realizar su pedido.  </a:t>
-            </a:r>
-          </a:p>
-          <a:p>
-            <a:pPr lvl="0"/>
+              <a:t>de tal tarea será el administrador del sistema teniendo en cuenta el nivel </a:t>
+            </a:r>
+            <a:r>
+              <a:rPr lang="es-ES" dirty="0" smtClean="0"/>
+              <a:t>de </a:t>
+            </a:r>
             <a:r>
               <a:rPr lang="es-ES" dirty="0"/>
-              <a:t>Deberá contar con los módulos  citados más arriba.</a:t>
-            </a:r>
-          </a:p>
-          <a:p>
-            <a:pPr lvl="0"/>
+              <a:t>acceso a cada usuario.</a:t>
+            </a:r>
+          </a:p>
+          <a:p>
+            <a:pPr lvl="0" algn="just"/>
             <a:r>
               <a:rPr lang="es-ES" dirty="0"/>
-              <a:t>Contará con módulos  de reportes estadísticos de los pedidos </a:t>
+              <a:t>Portabilidad: </a:t>
             </a:r>
             <a:r>
               <a:rPr lang="es-ES" dirty="0" smtClean="0"/>
-              <a:t>realizados.</a:t>
-            </a:r>
-          </a:p>
-          <a:p>
-            <a:pPr marL="0" lvl="0" indent="0">
-              <a:buNone/>
-            </a:pPr>
-            <a:r>
-              <a:rPr lang="es-ES" b="1" dirty="0"/>
-              <a:t>	</a:t>
-            </a:r>
-            <a:r>
-              <a:rPr lang="es-ES" b="1" dirty="0" smtClean="0"/>
-              <a:t>Rendimiento </a:t>
-            </a:r>
-            <a:r>
-              <a:rPr lang="es-ES" b="1" dirty="0"/>
-              <a:t>del sistema</a:t>
-            </a:r>
-            <a:endParaRPr lang="es-ES" sz="1600" dirty="0"/>
-          </a:p>
-          <a:p>
-            <a:pPr lvl="0"/>
+              <a:t>puesto </a:t>
+            </a:r>
             <a:r>
               <a:rPr lang="es-ES" dirty="0"/>
-              <a:t>Necesitará una terminal como mínimo.</a:t>
-            </a:r>
-          </a:p>
-          <a:p>
-            <a:pPr lvl="0"/>
-            <a:r>
-              <a:rPr lang="es-ES" dirty="0"/>
-              <a:t>El computador del usuario deberá contar con un navegador web (Google </a:t>
-            </a:r>
-            <a:r>
-              <a:rPr lang="es-ES" dirty="0" err="1"/>
-              <a:t>Chrome</a:t>
-            </a:r>
-            <a:r>
-              <a:rPr lang="es-ES" dirty="0"/>
-              <a:t>, Firefox, Internet Explorer).</a:t>
-            </a:r>
-          </a:p>
-          <a:p>
-            <a:pPr lvl="0"/>
-            <a:r>
-              <a:rPr lang="es-ES" dirty="0"/>
-              <a:t>Conexión a internet.</a:t>
-            </a:r>
-          </a:p>
-          <a:p>
-            <a:pPr lvl="0"/>
-            <a:endParaRPr lang="es-ES" dirty="0"/>
+              <a:t>que funcionara con cualquier plataforma web.</a:t>
+            </a:r>
           </a:p>
           <a:p>
             <a:endParaRPr lang="es-ES" dirty="0"/>
@@ -6610,7 +6593,7 @@
     </p:spTree>
     <p:extLst>
       <p:ext uri="{BB962C8B-B14F-4D97-AF65-F5344CB8AC3E}">
-        <p14:creationId xmlns:p14="http://schemas.microsoft.com/office/powerpoint/2010/main" val="3035906080"/>
+        <p14:creationId xmlns:p14="http://schemas.microsoft.com/office/powerpoint/2010/main" val="2249228712"/>
       </p:ext>
     </p:extLst>
   </p:cSld>
@@ -6646,87 +6629,81 @@
       </p:grpSpPr>
       <p:sp>
         <p:nvSpPr>
-          <p:cNvPr id="5" name="Título 1"/>
-          <p:cNvSpPr>
-            <a:spLocks noGrp="1"/>
-          </p:cNvSpPr>
-          <p:nvPr>
-            <p:ph idx="1"/>
+          <p:cNvPr id="2" name="Título 1"/>
+          <p:cNvSpPr>
+            <a:spLocks noGrp="1"/>
+          </p:cNvSpPr>
+          <p:nvPr>
+            <p:ph type="title"/>
           </p:nvPr>
         </p:nvSpPr>
         <p:spPr>
           <a:xfrm>
-            <a:off x="412124" y="811369"/>
-            <a:ext cx="11449318" cy="5640946"/>
+            <a:off x="697368" y="465595"/>
+            <a:ext cx="10689465" cy="1157141"/>
           </a:xfrm>
         </p:spPr>
         <p:txBody>
           <a:bodyPr/>
           <a:lstStyle/>
           <a:p>
-            <a:pPr marL="457200" lvl="1" indent="0">
-              <a:buNone/>
-            </a:pPr>
-            <a:r>
-              <a:rPr lang="es-ES" sz="2000" b="1" dirty="0"/>
-              <a:t>Requerimientos lógicos del sistema de base de datos</a:t>
-            </a:r>
-          </a:p>
-          <a:p>
-            <a:pPr lvl="0"/>
-            <a:r>
-              <a:rPr lang="es-ES" dirty="0"/>
-              <a:t>El sistema debe permitir la retención de datos para guardar un registro de ellos para posterior reportes.</a:t>
-            </a:r>
-          </a:p>
-          <a:p>
-            <a:pPr lvl="0"/>
-            <a:r>
-              <a:rPr lang="es-ES" dirty="0"/>
-              <a:t>El sistema debe tener en cuenta que información solo puede ser eliminada y cual es de gran importancia.</a:t>
-            </a:r>
-          </a:p>
-          <a:p>
-            <a:pPr lvl="0"/>
-            <a:r>
-              <a:rPr lang="es-ES" dirty="0"/>
-              <a:t>La infraestructura debe ser capaz de soportar estos procedimientos</a:t>
-            </a:r>
+            <a:pPr algn="ctr"/>
+            <a:r>
+              <a:rPr lang="es-ES" b="1" dirty="0"/>
+              <a:t>Definiciones, acrónimos y abreviaturas</a:t>
+            </a:r>
+            <a:endParaRPr lang="es-ES" dirty="0"/>
+          </a:p>
+        </p:txBody>
+      </p:sp>
+      <p:sp>
+        <p:nvSpPr>
+          <p:cNvPr id="5" name="4 Marcador de contenido"/>
+          <p:cNvSpPr>
+            <a:spLocks noGrp="1"/>
+          </p:cNvSpPr>
+          <p:nvPr>
+            <p:ph idx="1"/>
+          </p:nvPr>
+        </p:nvSpPr>
+        <p:spPr/>
+        <p:txBody>
+          <a:bodyPr/>
+          <a:lstStyle/>
+          <a:p>
+            <a:pPr algn="ctr"/>
             <a:r>
               <a:rPr lang="es-ES" dirty="0" smtClean="0"/>
-              <a:t>.</a:t>
-            </a:r>
-          </a:p>
-          <a:p>
-            <a:pPr marL="0" lvl="0" indent="0">
-              <a:buNone/>
-            </a:pPr>
-            <a:endParaRPr lang="es-ES" dirty="0"/>
-          </a:p>
-          <a:p>
-            <a:pPr marL="457200" lvl="1" indent="0">
-              <a:buNone/>
-            </a:pPr>
-            <a:r>
-              <a:rPr lang="es-ES" sz="2000" b="1" dirty="0"/>
-              <a:t>Propiedades emergentes del Sistema</a:t>
-            </a:r>
-          </a:p>
-          <a:p>
-            <a:pPr lvl="0"/>
-            <a:r>
-              <a:rPr lang="es-ES" dirty="0"/>
-              <a:t>Seguridad: será por medio de un usuario y una contraseña, el encargado de la asignación de tal tarea será el administrador del sistema teniendo en cuenta el nivel de acceso a cada usuario.</a:t>
-            </a:r>
-          </a:p>
-          <a:p>
-            <a:pPr lvl="0"/>
-            <a:r>
-              <a:rPr lang="es-ES" dirty="0"/>
-              <a:t>Portabilidad: puesto que funcionara con cualquier plataforma web.</a:t>
-            </a:r>
-          </a:p>
-          <a:p>
+              <a:t>De la Empresa</a:t>
+            </a:r>
+          </a:p>
+          <a:p>
+            <a:pPr algn="ctr"/>
+            <a:r>
+              <a:rPr lang="es-ES" dirty="0" smtClean="0"/>
+              <a:t>Registrarse</a:t>
+            </a:r>
+          </a:p>
+          <a:p>
+            <a:pPr algn="ctr"/>
+            <a:r>
+              <a:rPr lang="es-ES" dirty="0" smtClean="0"/>
+              <a:t>Pedido/s</a:t>
+            </a:r>
+          </a:p>
+          <a:p>
+            <a:pPr algn="ctr"/>
+            <a:r>
+              <a:rPr lang="es-ES" dirty="0" smtClean="0"/>
+              <a:t>Cancelación de Pedido/s</a:t>
+            </a:r>
+          </a:p>
+          <a:p>
+            <a:pPr algn="ctr"/>
+            <a:r>
+              <a:rPr lang="es-ES" dirty="0" smtClean="0"/>
+              <a:t>Confirmación del pedido </a:t>
+            </a:r>
             <a:endParaRPr lang="es-ES" dirty="0"/>
           </a:p>
         </p:txBody>
@@ -6734,7 +6711,7 @@
     </p:spTree>
     <p:extLst>
       <p:ext uri="{BB962C8B-B14F-4D97-AF65-F5344CB8AC3E}">
-        <p14:creationId xmlns:p14="http://schemas.microsoft.com/office/powerpoint/2010/main" val="2249228712"/>
+        <p14:creationId xmlns:p14="http://schemas.microsoft.com/office/powerpoint/2010/main" val="1364109173"/>
       </p:ext>
     </p:extLst>
   </p:cSld>
@@ -6770,7 +6747,7 @@
       </p:grpSpPr>
       <p:sp>
         <p:nvSpPr>
-          <p:cNvPr id="2" name="Título 1"/>
+          <p:cNvPr id="5" name="4 Título"/>
           <p:cNvSpPr>
             <a:spLocks noGrp="1"/>
           </p:cNvSpPr>
@@ -6783,33 +6760,77 @@
           <a:bodyPr/>
           <a:lstStyle/>
           <a:p>
-            <a:endParaRPr lang="es-ES"/>
-          </a:p>
-        </p:txBody>
-      </p:sp>
-      <p:sp>
-        <p:nvSpPr>
-          <p:cNvPr id="3" name="Marcador de contenido 2"/>
-          <p:cNvSpPr>
-            <a:spLocks noGrp="1"/>
-          </p:cNvSpPr>
-          <p:nvPr>
-            <p:ph idx="1"/>
-          </p:nvPr>
-        </p:nvSpPr>
-        <p:spPr/>
+            <a:pPr algn="ctr"/>
+            <a:r>
+              <a:rPr lang="es-ES" dirty="0" smtClean="0"/>
+              <a:t>Del Sistema</a:t>
+            </a:r>
+            <a:endParaRPr lang="es-ES" dirty="0"/>
+          </a:p>
+        </p:txBody>
+      </p:sp>
+      <p:sp>
+        <p:nvSpPr>
+          <p:cNvPr id="2" name="1 Marcador de contenido"/>
+          <p:cNvSpPr>
+            <a:spLocks noGrp="1"/>
+          </p:cNvSpPr>
+          <p:nvPr>
+            <p:ph idx="4294967295"/>
+          </p:nvPr>
+        </p:nvSpPr>
+        <p:spPr>
+          <a:xfrm>
+            <a:off x="1378040" y="1498846"/>
+            <a:ext cx="8947150" cy="4195762"/>
+          </a:xfrm>
+        </p:spPr>
         <p:txBody>
           <a:bodyPr/>
           <a:lstStyle/>
           <a:p>
-            <a:endParaRPr lang="es-ES"/>
+            <a:r>
+              <a:rPr lang="es-ES" dirty="0" smtClean="0"/>
+              <a:t>Del Sistema</a:t>
+            </a:r>
+          </a:p>
+          <a:p>
+            <a:r>
+              <a:rPr lang="es-ES" dirty="0" smtClean="0"/>
+              <a:t>Administrar </a:t>
+            </a:r>
+          </a:p>
+          <a:p>
+            <a:r>
+              <a:rPr lang="es-ES" dirty="0" smtClean="0"/>
+              <a:t>Usuario</a:t>
+            </a:r>
+          </a:p>
+          <a:p>
+            <a:r>
+              <a:rPr lang="es-ES" dirty="0" smtClean="0"/>
+              <a:t>Rol</a:t>
+            </a:r>
+          </a:p>
+          <a:p>
+            <a:r>
+              <a:rPr lang="es-ES" dirty="0" smtClean="0"/>
+              <a:t>Administrador del sistema</a:t>
+            </a:r>
+          </a:p>
+          <a:p>
+            <a:r>
+              <a:rPr lang="es-ES" dirty="0" smtClean="0"/>
+              <a:t>Pruebas </a:t>
+            </a:r>
+            <a:endParaRPr lang="es-ES" dirty="0"/>
           </a:p>
         </p:txBody>
       </p:sp>
     </p:spTree>
     <p:extLst>
       <p:ext uri="{BB962C8B-B14F-4D97-AF65-F5344CB8AC3E}">
-        <p14:creationId xmlns:p14="http://schemas.microsoft.com/office/powerpoint/2010/main" val="2246452530"/>
+        <p14:creationId xmlns:p14="http://schemas.microsoft.com/office/powerpoint/2010/main" val="3314193903"/>
       </p:ext>
     </p:extLst>
   </p:cSld>
@@ -6845,18 +6866,42 @@
       </p:grpSpPr>
       <p:sp>
         <p:nvSpPr>
-          <p:cNvPr id="2" name="Título 1"/>
+          <p:cNvPr id="2" name="1 Título"/>
           <p:cNvSpPr>
             <a:spLocks noGrp="1"/>
           </p:cNvSpPr>
           <p:nvPr>
             <p:ph type="title"/>
+          </p:nvPr>
+        </p:nvSpPr>
+        <p:spPr/>
+        <p:txBody>
+          <a:bodyPr/>
+          <a:lstStyle/>
+          <a:p>
+            <a:pPr algn="ctr"/>
+            <a:r>
+              <a:rPr lang="es-ES" dirty="0" smtClean="0"/>
+              <a:t>De Tecnología </a:t>
+            </a:r>
+            <a:endParaRPr lang="es-ES" dirty="0"/>
+          </a:p>
+        </p:txBody>
+      </p:sp>
+      <p:sp>
+        <p:nvSpPr>
+          <p:cNvPr id="3" name="2 Marcador de contenido"/>
+          <p:cNvSpPr>
+            <a:spLocks noGrp="1"/>
+          </p:cNvSpPr>
+          <p:nvPr>
+            <p:ph idx="1"/>
           </p:nvPr>
         </p:nvSpPr>
         <p:spPr>
           <a:xfrm>
-            <a:off x="787520" y="1148176"/>
-            <a:ext cx="10689465" cy="1157141"/>
+            <a:off x="1180585" y="1576400"/>
+            <a:ext cx="8946541" cy="4195481"/>
           </a:xfrm>
         </p:spPr>
         <p:txBody>
@@ -6864,67 +6909,84 @@
           <a:lstStyle/>
           <a:p>
             <a:r>
-              <a:rPr lang="es-ES" b="1" dirty="0"/>
-              <a:t>Definiciones, acrónimos y abreviaturas</a:t>
+              <a:rPr lang="es-ES" dirty="0" smtClean="0"/>
+              <a:t>Servidor web</a:t>
+            </a:r>
+          </a:p>
+          <a:p>
+            <a:r>
+              <a:rPr lang="es-ES" dirty="0" smtClean="0"/>
+              <a:t>HTML</a:t>
+            </a:r>
+          </a:p>
+          <a:p>
+            <a:r>
+              <a:rPr lang="es-ES" dirty="0" smtClean="0"/>
+              <a:t>Sistema de Gestión de base de datos (BD)</a:t>
+            </a:r>
+          </a:p>
+          <a:p>
+            <a:r>
+              <a:rPr lang="es-ES" dirty="0" smtClean="0"/>
+              <a:t>Base de datos</a:t>
+            </a:r>
+          </a:p>
+          <a:p>
+            <a:r>
+              <a:rPr lang="es-ES" dirty="0" smtClean="0"/>
+              <a:t>Aplicación </a:t>
+            </a:r>
+          </a:p>
+          <a:p>
+            <a:r>
+              <a:rPr lang="es-ES" dirty="0" err="1" smtClean="0"/>
+              <a:t>MySQL</a:t>
+            </a:r>
+            <a:endParaRPr lang="es-ES" dirty="0" smtClean="0"/>
+          </a:p>
+          <a:p>
+            <a:r>
+              <a:rPr lang="es-ES" dirty="0" err="1" smtClean="0"/>
+              <a:t>RoR</a:t>
+            </a:r>
+            <a:r>
+              <a:rPr lang="es-ES" dirty="0" smtClean="0"/>
+              <a:t> (Lenguaje de Programación)</a:t>
+            </a:r>
+          </a:p>
+          <a:p>
+            <a:r>
+              <a:rPr lang="es-ES" dirty="0" smtClean="0"/>
+              <a:t>Apache</a:t>
+            </a:r>
+          </a:p>
+          <a:p>
+            <a:r>
+              <a:rPr lang="es-ES" dirty="0" smtClean="0"/>
+              <a:t>Dirección IP (Protocolo de </a:t>
+            </a:r>
+            <a:r>
+              <a:rPr lang="es-ES" dirty="0" err="1" smtClean="0"/>
+              <a:t>Intermet</a:t>
+            </a:r>
+            <a:r>
+              <a:rPr lang="es-ES" dirty="0" smtClean="0"/>
+              <a:t>)</a:t>
             </a:r>
             <a:endParaRPr lang="es-ES" dirty="0"/>
           </a:p>
         </p:txBody>
       </p:sp>
-      <p:pic>
-        <p:nvPicPr>
-          <p:cNvPr id="4" name="Marcador de contenido 3"/>
-          <p:cNvPicPr>
-            <a:picLocks noGrp="1" noChangeAspect="1"/>
-          </p:cNvPicPr>
-          <p:nvPr>
-            <p:ph idx="1"/>
-          </p:nvPr>
-        </p:nvPicPr>
-        <p:blipFill rotWithShape="1">
-          <a:blip r:embed="rId2"/>
-          <a:srcRect l="27195" t="26141" r="10498" b="26192"/>
-          <a:stretch/>
-        </p:blipFill>
-        <p:spPr>
-          <a:xfrm>
-            <a:off x="1822567" y="2343952"/>
-            <a:ext cx="8361793" cy="3580327"/>
-          </a:xfrm>
-          <a:prstGeom prst="rect">
-            <a:avLst/>
-          </a:prstGeom>
-          <a:ln w="228600" cap="sq" cmpd="thickThin">
-            <a:solidFill>
-              <a:srgbClr val="000000"/>
-            </a:solidFill>
-            <a:prstDash val="solid"/>
-            <a:miter lim="800000"/>
-          </a:ln>
-          <a:effectLst>
-            <a:innerShdw blurRad="76200">
-              <a:srgbClr val="000000"/>
-            </a:innerShdw>
-          </a:effectLst>
-        </p:spPr>
-      </p:pic>
     </p:spTree>
     <p:extLst>
       <p:ext uri="{BB962C8B-B14F-4D97-AF65-F5344CB8AC3E}">
-        <p14:creationId xmlns:p14="http://schemas.microsoft.com/office/powerpoint/2010/main" val="1364109173"/>
+        <p14:creationId xmlns:p14="http://schemas.microsoft.com/office/powerpoint/2010/main" val="3111995629"/>
       </p:ext>
     </p:extLst>
   </p:cSld>
   <p:clrMapOvr>
     <a:masterClrMapping/>
   </p:clrMapOvr>
-  <p:timing>
-    <p:tnLst>
-      <p:par>
-        <p:cTn id="1" dur="indefinite" restart="never" nodeType="tmRoot"/>
-      </p:par>
-    </p:tnLst>
-  </p:timing>
 </p:sld>
 </file>
 
@@ -6949,43 +7011,32 @@
         <p:nvPicPr>
           <p:cNvPr id="4" name="Marcador de contenido 3"/>
           <p:cNvPicPr>
-            <a:picLocks noGrp="1" noChangeAspect="1"/>
+            <a:picLocks noGrp="1"/>
           </p:cNvPicPr>
           <p:nvPr>
             <p:ph idx="1"/>
           </p:nvPr>
         </p:nvPicPr>
-        <p:blipFill rotWithShape="1">
+        <p:blipFill>
           <a:blip r:embed="rId2"/>
-          <a:srcRect l="26698" t="29965" r="11693" b="20924"/>
-          <a:stretch/>
+          <a:stretch>
+            <a:fillRect/>
+          </a:stretch>
         </p:blipFill>
         <p:spPr>
           <a:xfrm>
-            <a:off x="1183326" y="1043189"/>
-            <a:ext cx="9956899" cy="5127243"/>
+            <a:off x="1135487" y="940157"/>
+            <a:ext cx="10094891" cy="4932607"/>
           </a:xfrm>
           <a:prstGeom prst="rect">
             <a:avLst/>
           </a:prstGeom>
-          <a:ln w="228600" cap="sq" cmpd="thickThin">
-            <a:solidFill>
-              <a:srgbClr val="000000"/>
-            </a:solidFill>
-            <a:prstDash val="solid"/>
-            <a:miter lim="800000"/>
-          </a:ln>
-          <a:effectLst>
-            <a:innerShdw blurRad="76200">
-              <a:srgbClr val="000000"/>
-            </a:innerShdw>
-          </a:effectLst>
         </p:spPr>
       </p:pic>
     </p:spTree>
     <p:extLst>
       <p:ext uri="{BB962C8B-B14F-4D97-AF65-F5344CB8AC3E}">
-        <p14:creationId xmlns:p14="http://schemas.microsoft.com/office/powerpoint/2010/main" val="3314193903"/>
+        <p14:creationId xmlns:p14="http://schemas.microsoft.com/office/powerpoint/2010/main" val="925632106"/>
       </p:ext>
     </p:extLst>
   </p:cSld>
@@ -7019,101 +7070,119 @@
           <a:chExt cx="0" cy="0"/>
         </a:xfrm>
       </p:grpSpPr>
-      <p:pic>
-        <p:nvPicPr>
-          <p:cNvPr id="4" name="Marcador de contenido 3"/>
-          <p:cNvPicPr>
-            <a:picLocks noGrp="1" noChangeAspect="1"/>
-          </p:cNvPicPr>
+      <p:sp>
+        <p:nvSpPr>
+          <p:cNvPr id="2" name="Título 1"/>
+          <p:cNvSpPr>
+            <a:spLocks noGrp="1"/>
+          </p:cNvSpPr>
+          <p:nvPr>
+            <p:ph type="title"/>
+          </p:nvPr>
+        </p:nvSpPr>
+        <p:spPr/>
+        <p:txBody>
+          <a:bodyPr/>
+          <a:lstStyle/>
+          <a:p>
+            <a:r>
+              <a:rPr lang="es-ES" dirty="0" smtClean="0"/>
+              <a:t>Roles del Grupo</a:t>
+            </a:r>
+            <a:br>
+              <a:rPr lang="es-ES" dirty="0" smtClean="0"/>
+            </a:br>
+            <a:endParaRPr lang="es-ES" dirty="0"/>
+          </a:p>
+        </p:txBody>
+      </p:sp>
+      <p:sp>
+        <p:nvSpPr>
+          <p:cNvPr id="3" name="Marcador de contenido 2"/>
+          <p:cNvSpPr>
+            <a:spLocks noGrp="1"/>
+          </p:cNvSpPr>
           <p:nvPr>
             <p:ph idx="1"/>
           </p:nvPr>
-        </p:nvPicPr>
-        <p:blipFill>
-          <a:blip r:embed="rId2"/>
-          <a:stretch>
-            <a:fillRect/>
-          </a:stretch>
-        </p:blipFill>
-        <p:spPr>
-          <a:xfrm>
-            <a:off x="1103313" y="3483686"/>
-            <a:ext cx="8947150" cy="1333665"/>
-          </a:xfrm>
-          <a:prstGeom prst="rect">
-            <a:avLst/>
-          </a:prstGeom>
-        </p:spPr>
-      </p:pic>
-      <p:pic>
-        <p:nvPicPr>
-          <p:cNvPr id="6" name="Imagen 5"/>
-          <p:cNvPicPr>
-            <a:picLocks noChangeAspect="1"/>
-          </p:cNvPicPr>
-          <p:nvPr/>
-        </p:nvPicPr>
-        <p:blipFill>
-          <a:blip r:embed="rId2"/>
-          <a:stretch>
-            <a:fillRect/>
-          </a:stretch>
-        </p:blipFill>
-        <p:spPr>
-          <a:xfrm>
-            <a:off x="1392528" y="2727899"/>
-            <a:ext cx="9406943" cy="1402202"/>
-          </a:xfrm>
-          <a:prstGeom prst="rect">
-            <a:avLst/>
-          </a:prstGeom>
-        </p:spPr>
-      </p:pic>
-      <p:pic>
-        <p:nvPicPr>
-          <p:cNvPr id="7" name="Imagen 6"/>
-          <p:cNvPicPr>
-            <a:picLocks noChangeAspect="1"/>
-          </p:cNvPicPr>
-          <p:nvPr/>
-        </p:nvPicPr>
-        <p:blipFill rotWithShape="1">
-          <a:blip r:embed="rId3"/>
-          <a:srcRect l="27802" t="21407" r="15069" b="18151"/>
-          <a:stretch/>
-        </p:blipFill>
-        <p:spPr>
-          <a:xfrm>
-            <a:off x="1340075" y="1114022"/>
-            <a:ext cx="8710388" cy="5181179"/>
-          </a:xfrm>
-          <a:prstGeom prst="rect">
-            <a:avLst/>
-          </a:prstGeom>
-          <a:ln w="228600" cap="sq" cmpd="thickThin">
-            <a:solidFill>
-              <a:srgbClr val="000000"/>
-            </a:solidFill>
-            <a:prstDash val="solid"/>
-            <a:miter lim="800000"/>
-          </a:ln>
-          <a:effectLst>
-            <a:innerShdw blurRad="76200">
-              <a:srgbClr val="000000"/>
-            </a:innerShdw>
-          </a:effectLst>
-        </p:spPr>
-      </p:pic>
+        </p:nvSpPr>
+        <p:spPr/>
+        <p:txBody>
+          <a:bodyPr>
+            <a:normAutofit/>
+          </a:bodyPr>
+          <a:lstStyle/>
+          <a:p>
+            <a:pPr lvl="0"/>
+            <a:r>
+              <a:rPr lang="es-ES" dirty="0"/>
+              <a:t>Líder: </a:t>
+            </a:r>
+          </a:p>
+          <a:p>
+            <a:pPr lvl="0"/>
+            <a:r>
+              <a:rPr lang="es-ES" dirty="0"/>
+              <a:t>Riesgos: </a:t>
+            </a:r>
+          </a:p>
+          <a:p>
+            <a:pPr lvl="0"/>
+            <a:r>
+              <a:rPr lang="es-ES" dirty="0"/>
+              <a:t>Documentación: </a:t>
+            </a:r>
+          </a:p>
+          <a:p>
+            <a:pPr lvl="0"/>
+            <a:r>
+              <a:rPr lang="es-ES" dirty="0"/>
+              <a:t>Gestor de configuraciones</a:t>
+            </a:r>
+            <a:r>
+              <a:rPr lang="es-ES" dirty="0" smtClean="0"/>
+              <a:t>:</a:t>
+            </a:r>
+            <a:endParaRPr lang="es-ES" dirty="0"/>
+          </a:p>
+          <a:p>
+            <a:pPr lvl="0"/>
+            <a:r>
+              <a:rPr lang="es-ES" dirty="0"/>
+              <a:t>Desarrollador: </a:t>
+            </a:r>
+          </a:p>
+          <a:p>
+            <a:pPr lvl="0"/>
+            <a:r>
+              <a:rPr lang="es-ES" dirty="0" err="1" smtClean="0"/>
+              <a:t>Testin</a:t>
+            </a:r>
+            <a:r>
+              <a:rPr lang="es-ES" dirty="0" smtClean="0"/>
+              <a:t>:</a:t>
+            </a:r>
+            <a:endParaRPr lang="es-ES" dirty="0"/>
+          </a:p>
+        </p:txBody>
+      </p:sp>
     </p:spTree>
     <p:extLst>
       <p:ext uri="{BB962C8B-B14F-4D97-AF65-F5344CB8AC3E}">
-        <p14:creationId xmlns:p14="http://schemas.microsoft.com/office/powerpoint/2010/main" val="3111995629"/>
+        <p14:creationId xmlns:p14="http://schemas.microsoft.com/office/powerpoint/2010/main" val="2054422862"/>
       </p:ext>
     </p:extLst>
   </p:cSld>
   <p:clrMapOvr>
     <a:masterClrMapping/>
   </p:clrMapOvr>
+  <p:timing>
+    <p:tnLst>
+      <p:par>
+        <p:cTn id="1" dur="indefinite" restart="never" nodeType="tmRoot"/>
+      </p:par>
+    </p:tnLst>
+  </p:timing>
 </p:sld>
 </file>
 
@@ -7134,49 +7203,62 @@
           <a:chExt cx="0" cy="0"/>
         </a:xfrm>
       </p:grpSpPr>
-      <p:pic>
-        <p:nvPicPr>
-          <p:cNvPr id="4" name="Marcador de contenido 3"/>
-          <p:cNvPicPr>
-            <a:picLocks noGrp="1"/>
-          </p:cNvPicPr>
+      <p:sp>
+        <p:nvSpPr>
+          <p:cNvPr id="2" name="Título 1"/>
+          <p:cNvSpPr>
+            <a:spLocks noGrp="1"/>
+          </p:cNvSpPr>
+          <p:nvPr>
+            <p:ph type="title"/>
+          </p:nvPr>
+        </p:nvSpPr>
+        <p:spPr/>
+        <p:txBody>
+          <a:bodyPr/>
+          <a:lstStyle/>
+          <a:p>
+            <a:r>
+              <a:rPr lang="es-ES" dirty="0" err="1" smtClean="0"/>
+              <a:t>Lider</a:t>
+            </a:r>
+            <a:r>
+              <a:rPr lang="es-ES" dirty="0" smtClean="0"/>
+              <a:t> de Grupo</a:t>
+            </a:r>
+            <a:endParaRPr lang="es-ES" dirty="0"/>
+          </a:p>
+        </p:txBody>
+      </p:sp>
+      <p:sp>
+        <p:nvSpPr>
+          <p:cNvPr id="3" name="Marcador de contenido 2"/>
+          <p:cNvSpPr>
+            <a:spLocks noGrp="1"/>
+          </p:cNvSpPr>
           <p:nvPr>
             <p:ph idx="1"/>
           </p:nvPr>
-        </p:nvPicPr>
-        <p:blipFill>
-          <a:blip r:embed="rId2"/>
-          <a:stretch>
-            <a:fillRect/>
-          </a:stretch>
-        </p:blipFill>
-        <p:spPr>
-          <a:xfrm>
-            <a:off x="1122608" y="1339403"/>
-            <a:ext cx="10094891" cy="4932607"/>
-          </a:xfrm>
-          <a:prstGeom prst="rect">
-            <a:avLst/>
-          </a:prstGeom>
-        </p:spPr>
-      </p:pic>
+        </p:nvSpPr>
+        <p:spPr/>
+        <p:txBody>
+          <a:bodyPr/>
+          <a:lstStyle/>
+          <a:p>
+            <a:endParaRPr lang="es-ES"/>
+          </a:p>
+        </p:txBody>
+      </p:sp>
     </p:spTree>
     <p:extLst>
       <p:ext uri="{BB962C8B-B14F-4D97-AF65-F5344CB8AC3E}">
-        <p14:creationId xmlns:p14="http://schemas.microsoft.com/office/powerpoint/2010/main" val="925632106"/>
+        <p14:creationId xmlns:p14="http://schemas.microsoft.com/office/powerpoint/2010/main" val="3579523673"/>
       </p:ext>
     </p:extLst>
   </p:cSld>
   <p:clrMapOvr>
     <a:masterClrMapping/>
   </p:clrMapOvr>
-  <p:timing>
-    <p:tnLst>
-      <p:par>
-        <p:cTn id="1" dur="indefinite" restart="never" nodeType="tmRoot"/>
-      </p:par>
-    </p:tnLst>
-  </p:timing>
 </p:sld>
 </file>
 
@@ -7212,14 +7294,7 @@
           <a:bodyPr/>
           <a:lstStyle/>
           <a:p>
-            <a:r>
-              <a:rPr lang="es-ES" dirty="0" smtClean="0"/>
-              <a:t>Roles del Grupo</a:t>
-            </a:r>
-            <a:br>
-              <a:rPr lang="es-ES" dirty="0" smtClean="0"/>
-            </a:br>
-            <a:endParaRPr lang="es-ES" dirty="0"/>
+            <a:endParaRPr lang="es-ES"/>
           </a:p>
         </p:txBody>
       </p:sp>
@@ -7235,81 +7310,23 @@
         </p:nvSpPr>
         <p:spPr/>
         <p:txBody>
-          <a:bodyPr>
-            <a:normAutofit/>
-          </a:bodyPr>
+          <a:bodyPr/>
           <a:lstStyle/>
           <a:p>
-            <a:pPr lvl="0"/>
-            <a:r>
-              <a:rPr lang="es-ES" dirty="0"/>
-              <a:t>Líder: </a:t>
-            </a:r>
-          </a:p>
-          <a:p>
-            <a:pPr lvl="0"/>
-            <a:r>
-              <a:rPr lang="es-ES" dirty="0"/>
-              <a:t>Riesgos: </a:t>
-            </a:r>
-          </a:p>
-          <a:p>
-            <a:pPr lvl="0"/>
-            <a:r>
-              <a:rPr lang="es-ES" dirty="0"/>
-              <a:t>Documentación: </a:t>
-            </a:r>
-          </a:p>
-          <a:p>
-            <a:pPr lvl="0"/>
-            <a:r>
-              <a:rPr lang="es-ES" dirty="0"/>
-              <a:t>Gestor de configuraciones</a:t>
-            </a:r>
-            <a:r>
-              <a:rPr lang="es-ES" dirty="0" smtClean="0"/>
-              <a:t>:</a:t>
-            </a:r>
-            <a:endParaRPr lang="es-ES" dirty="0"/>
-          </a:p>
-          <a:p>
-            <a:pPr lvl="0"/>
-            <a:r>
-              <a:rPr lang="es-ES" dirty="0"/>
-              <a:t>Desarrollador: </a:t>
-            </a:r>
-          </a:p>
-          <a:p>
-            <a:pPr lvl="0"/>
-            <a:r>
-              <a:rPr lang="es-ES" dirty="0" err="1" smtClean="0"/>
-              <a:t>Testin</a:t>
-            </a:r>
-            <a:r>
-              <a:rPr lang="es-ES" dirty="0" smtClean="0"/>
-              <a:t>:</a:t>
-            </a:r>
-            <a:endParaRPr lang="es-ES" dirty="0"/>
+            <a:endParaRPr lang="es-ES"/>
           </a:p>
         </p:txBody>
       </p:sp>
     </p:spTree>
     <p:extLst>
       <p:ext uri="{BB962C8B-B14F-4D97-AF65-F5344CB8AC3E}">
-        <p14:creationId xmlns:p14="http://schemas.microsoft.com/office/powerpoint/2010/main" val="2054422862"/>
+        <p14:creationId xmlns:p14="http://schemas.microsoft.com/office/powerpoint/2010/main" val="534596362"/>
       </p:ext>
     </p:extLst>
   </p:cSld>
   <p:clrMapOvr>
     <a:masterClrMapping/>
   </p:clrMapOvr>
-  <p:timing>
-    <p:tnLst>
-      <p:par>
-        <p:cTn id="1" dur="indefinite" restart="never" nodeType="tmRoot"/>
-      </p:par>
-    </p:tnLst>
-  </p:timing>
 </p:sld>
 </file>
 
@@ -7415,150 +7432,6 @@
           <a:bodyPr/>
           <a:lstStyle/>
           <a:p>
-            <a:r>
-              <a:rPr lang="es-ES" dirty="0" err="1" smtClean="0"/>
-              <a:t>Lider</a:t>
-            </a:r>
-            <a:r>
-              <a:rPr lang="es-ES" dirty="0" smtClean="0"/>
-              <a:t> de Grupo</a:t>
-            </a:r>
-            <a:endParaRPr lang="es-ES" dirty="0"/>
-          </a:p>
-        </p:txBody>
-      </p:sp>
-      <p:sp>
-        <p:nvSpPr>
-          <p:cNvPr id="3" name="Marcador de contenido 2"/>
-          <p:cNvSpPr>
-            <a:spLocks noGrp="1"/>
-          </p:cNvSpPr>
-          <p:nvPr>
-            <p:ph idx="1"/>
-          </p:nvPr>
-        </p:nvSpPr>
-        <p:spPr/>
-        <p:txBody>
-          <a:bodyPr/>
-          <a:lstStyle/>
-          <a:p>
-            <a:endParaRPr lang="es-ES"/>
-          </a:p>
-        </p:txBody>
-      </p:sp>
-    </p:spTree>
-    <p:extLst>
-      <p:ext uri="{BB962C8B-B14F-4D97-AF65-F5344CB8AC3E}">
-        <p14:creationId xmlns:p14="http://schemas.microsoft.com/office/powerpoint/2010/main" val="3579523673"/>
-      </p:ext>
-    </p:extLst>
-  </p:cSld>
-  <p:clrMapOvr>
-    <a:masterClrMapping/>
-  </p:clrMapOvr>
-</p:sld>
-</file>
-
-<file path=ppt/slides/slide21.xml><?xml version="1.0" encoding="utf-8"?>
-<p:sld xmlns:a="http://schemas.openxmlformats.org/drawingml/2006/main" xmlns:r="http://schemas.openxmlformats.org/officeDocument/2006/relationships" xmlns:p="http://schemas.openxmlformats.org/presentationml/2006/main">
-  <p:cSld>
-    <p:spTree>
-      <p:nvGrpSpPr>
-        <p:cNvPr id="1" name=""/>
-        <p:cNvGrpSpPr/>
-        <p:nvPr/>
-      </p:nvGrpSpPr>
-      <p:grpSpPr>
-        <a:xfrm>
-          <a:off x="0" y="0"/>
-          <a:ext cx="0" cy="0"/>
-          <a:chOff x="0" y="0"/>
-          <a:chExt cx="0" cy="0"/>
-        </a:xfrm>
-      </p:grpSpPr>
-      <p:sp>
-        <p:nvSpPr>
-          <p:cNvPr id="2" name="Título 1"/>
-          <p:cNvSpPr>
-            <a:spLocks noGrp="1"/>
-          </p:cNvSpPr>
-          <p:nvPr>
-            <p:ph type="title"/>
-          </p:nvPr>
-        </p:nvSpPr>
-        <p:spPr/>
-        <p:txBody>
-          <a:bodyPr/>
-          <a:lstStyle/>
-          <a:p>
-            <a:endParaRPr lang="es-ES"/>
-          </a:p>
-        </p:txBody>
-      </p:sp>
-      <p:sp>
-        <p:nvSpPr>
-          <p:cNvPr id="3" name="Marcador de contenido 2"/>
-          <p:cNvSpPr>
-            <a:spLocks noGrp="1"/>
-          </p:cNvSpPr>
-          <p:nvPr>
-            <p:ph idx="1"/>
-          </p:nvPr>
-        </p:nvSpPr>
-        <p:spPr/>
-        <p:txBody>
-          <a:bodyPr/>
-          <a:lstStyle/>
-          <a:p>
-            <a:endParaRPr lang="es-ES"/>
-          </a:p>
-        </p:txBody>
-      </p:sp>
-    </p:spTree>
-    <p:extLst>
-      <p:ext uri="{BB962C8B-B14F-4D97-AF65-F5344CB8AC3E}">
-        <p14:creationId xmlns:p14="http://schemas.microsoft.com/office/powerpoint/2010/main" val="534596362"/>
-      </p:ext>
-    </p:extLst>
-  </p:cSld>
-  <p:clrMapOvr>
-    <a:masterClrMapping/>
-  </p:clrMapOvr>
-</p:sld>
-</file>
-
-<file path=ppt/slides/slide22.xml><?xml version="1.0" encoding="utf-8"?>
-<p:sld xmlns:a="http://schemas.openxmlformats.org/drawingml/2006/main" xmlns:r="http://schemas.openxmlformats.org/officeDocument/2006/relationships" xmlns:p="http://schemas.openxmlformats.org/presentationml/2006/main">
-  <p:cSld>
-    <p:spTree>
-      <p:nvGrpSpPr>
-        <p:cNvPr id="1" name=""/>
-        <p:cNvGrpSpPr/>
-        <p:nvPr/>
-      </p:nvGrpSpPr>
-      <p:grpSpPr>
-        <a:xfrm>
-          <a:off x="0" y="0"/>
-          <a:ext cx="0" cy="0"/>
-          <a:chOff x="0" y="0"/>
-          <a:chExt cx="0" cy="0"/>
-        </a:xfrm>
-      </p:grpSpPr>
-      <p:sp>
-        <p:nvSpPr>
-          <p:cNvPr id="2" name="Título 1"/>
-          <p:cNvSpPr>
-            <a:spLocks noGrp="1"/>
-          </p:cNvSpPr>
-          <p:nvPr>
-            <p:ph type="title"/>
-          </p:nvPr>
-        </p:nvSpPr>
-        <p:spPr/>
-        <p:txBody>
-          <a:bodyPr/>
-          <a:lstStyle/>
-          <a:p>
             <a:endParaRPr lang="es-ES"/>
           </a:p>
         </p:txBody>
@@ -7595,7 +7468,7 @@
 </p:sld>
 </file>
 
-<file path=ppt/slides/slide23.xml><?xml version="1.0" encoding="utf-8"?>
+<file path=ppt/slides/slide21.xml><?xml version="1.0" encoding="utf-8"?>
 <p:sld xmlns:a="http://schemas.openxmlformats.org/drawingml/2006/main" xmlns:r="http://schemas.openxmlformats.org/officeDocument/2006/relationships" xmlns:p="http://schemas.openxmlformats.org/presentationml/2006/main">
   <p:cSld>
     <p:spTree>
@@ -7700,9 +7573,10 @@
           <a:bodyPr/>
           <a:lstStyle/>
           <a:p>
+            <a:pPr algn="ctr"/>
             <a:r>
               <a:rPr lang="es-ES" dirty="0" smtClean="0"/>
-              <a:t>Integrantes;</a:t>
+              <a:t>Integrantes</a:t>
             </a:r>
             <a:endParaRPr lang="es-ES" dirty="0"/>
           </a:p>
@@ -7728,12 +7602,14 @@
           <a:bodyPr/>
           <a:lstStyle/>
           <a:p>
+            <a:pPr algn="ctr"/>
             <a:r>
               <a:rPr lang="es-ES" dirty="0" smtClean="0"/>
               <a:t>Francisco Benitez</a:t>
             </a:r>
           </a:p>
           <a:p>
+            <a:pPr algn="ctr"/>
             <a:r>
               <a:rPr lang="es-ES" dirty="0" smtClean="0"/>
               <a:t>Melanie </a:t>
@@ -7745,35 +7621,35 @@
             <a:endParaRPr lang="es-ES" dirty="0" smtClean="0"/>
           </a:p>
           <a:p>
-            <a:r>
-              <a:rPr lang="es-ES" dirty="0" err="1" smtClean="0"/>
-              <a:t>Miryam</a:t>
-            </a:r>
+            <a:pPr algn="ctr"/>
             <a:r>
               <a:rPr lang="es-ES" dirty="0" smtClean="0"/>
-              <a:t> Medina</a:t>
-            </a:r>
-          </a:p>
-          <a:p>
+              <a:t>Myriam </a:t>
+            </a:r>
+            <a:r>
+              <a:rPr lang="es-ES" dirty="0" smtClean="0"/>
+              <a:t>Medina</a:t>
+            </a:r>
+          </a:p>
+          <a:p>
+            <a:pPr algn="ctr"/>
             <a:r>
               <a:rPr lang="es-ES" dirty="0" smtClean="0"/>
               <a:t>Ricardo Maciel</a:t>
             </a:r>
           </a:p>
           <a:p>
+            <a:pPr algn="ctr"/>
             <a:r>
               <a:rPr lang="es-ES" dirty="0" smtClean="0"/>
               <a:t>Sebastian Kazlauskas</a:t>
             </a:r>
           </a:p>
           <a:p>
-            <a:r>
-              <a:rPr lang="es-ES" smtClean="0"/>
-              <a:t>Orlando </a:t>
-            </a:r>
+            <a:pPr algn="ctr"/>
             <a:r>
               <a:rPr lang="es-ES" dirty="0" smtClean="0"/>
-              <a:t>Cardozo</a:t>
+              <a:t>Orlando Cardozo</a:t>
             </a:r>
             <a:endParaRPr lang="es-ES" dirty="0"/>
           </a:p>
@@ -7862,10 +7738,11 @@
         </p:spPr>
         <p:txBody>
           <a:bodyPr>
-            <a:normAutofit fontScale="92500" lnSpcReduction="10000"/>
+            <a:normAutofit/>
           </a:bodyPr>
           <a:lstStyle/>
           <a:p>
+            <a:pPr algn="just"/>
             <a:r>
               <a:rPr lang="es-ES" sz="2800" dirty="0" err="1"/>
               <a:t>DeliverYApp</a:t>
@@ -7875,22 +7752,17 @@
               <a:t> será un entorno web en el que se podrán registrar las empresas gastronómicas y así de esa forma poder ofrecer el servicio de </a:t>
             </a:r>
             <a:r>
-              <a:rPr lang="es-ES" sz="2800" dirty="0" err="1"/>
+              <a:rPr lang="es-ES" sz="2800" dirty="0" err="1" smtClean="0"/>
               <a:t>delivery</a:t>
             </a:r>
             <a:r>
-              <a:rPr lang="es-ES" sz="2800" dirty="0"/>
-              <a:t> dicho sistema permitirá efectuar pedidos  del menú seleccionado por el cliente, una vez confirmado el pedido el usuario recibe las notificaciones de los pedidos y los procesa. </a:t>
-            </a:r>
-            <a:endParaRPr lang="es-ES" sz="2800" dirty="0" smtClean="0"/>
-          </a:p>
-          <a:p>
-            <a:pPr marL="0" indent="0">
-              <a:buNone/>
-            </a:pPr>
+              <a:rPr lang="es-ES" sz="2800" dirty="0" smtClean="0"/>
+              <a:t>.</a:t>
+            </a:r>
             <a:endParaRPr lang="es-ES" sz="2800" dirty="0"/>
           </a:p>
           <a:p>
+            <a:pPr algn="just"/>
             <a:r>
               <a:rPr lang="es-ES" sz="2800" dirty="0"/>
               <a:t>No contará con la funcionalidad de facturación y contabilidad.</a:t>
@@ -7961,6 +7833,7 @@
           <a:bodyPr/>
           <a:lstStyle/>
           <a:p>
+            <a:pPr algn="ctr"/>
             <a:r>
               <a:rPr lang="es-ES" dirty="0" smtClean="0"/>
               <a:t>Objetivos del Sistema</a:t>
@@ -7989,9 +7862,41 @@
           <a:bodyPr/>
           <a:lstStyle/>
           <a:p>
+            <a:pPr algn="just"/>
             <a:r>
               <a:rPr lang="es-ES" dirty="0"/>
-              <a:t>Los objetivos del sistema son minimizar los problemas referentes a la gestión de pedidos de parte del cliente, optimizar la gestión de ventas. </a:t>
+              <a:t>M</a:t>
+            </a:r>
+            <a:r>
+              <a:rPr lang="es-ES" dirty="0" smtClean="0"/>
+              <a:t>inimizar </a:t>
+            </a:r>
+            <a:r>
+              <a:rPr lang="es-ES" dirty="0"/>
+              <a:t>los problemas referentes a la gestión de pedidos de parte del </a:t>
+            </a:r>
+            <a:r>
+              <a:rPr lang="es-ES" dirty="0" smtClean="0"/>
+              <a:t>cliente</a:t>
+            </a:r>
+          </a:p>
+          <a:p>
+            <a:pPr algn="just"/>
+            <a:r>
+              <a:rPr lang="es-ES" dirty="0" smtClean="0"/>
+              <a:t> </a:t>
+            </a:r>
+            <a:r>
+              <a:rPr lang="es-ES" dirty="0"/>
+              <a:t>O</a:t>
+            </a:r>
+            <a:r>
+              <a:rPr lang="es-ES" dirty="0" smtClean="0"/>
+              <a:t>ptimizar </a:t>
+            </a:r>
+            <a:r>
+              <a:rPr lang="es-ES" dirty="0"/>
+              <a:t>la gestión de ventas. </a:t>
             </a:r>
           </a:p>
           <a:p>
@@ -8096,6 +8001,7 @@
             </a:lvl9pPr>
           </a:lstStyle>
           <a:p>
+            <a:pPr algn="ctr"/>
             <a:r>
               <a:rPr lang="es-ES" dirty="0" smtClean="0"/>
               <a:t>Los Beneficios del sistemas</a:t>
@@ -8353,6 +8259,7 @@
             </a:lvl9pPr>
           </a:lstStyle>
           <a:p>
+            <a:pPr algn="just"/>
             <a:r>
               <a:rPr lang="es-ES" dirty="0"/>
               <a:t>El beneficio con que cuenta el sistema es el de agilizar los pedidos de tal forma que no se pierda tiempo con las llamadas. </a:t>
@@ -8461,6 +8368,7 @@
             </a:lvl9pPr>
           </a:lstStyle>
           <a:p>
+            <a:pPr algn="ctr"/>
             <a:r>
               <a:rPr lang="es-ES" dirty="0" smtClean="0"/>
               <a:t>La Meta</a:t>
@@ -8718,6 +8626,7 @@
             </a:lvl9pPr>
           </a:lstStyle>
           <a:p>
+            <a:pPr algn="just"/>
             <a:r>
               <a:rPr lang="es-ES" dirty="0" smtClean="0"/>
               <a:t>La </a:t>
@@ -8795,11 +8704,11 @@
         </p:spPr>
         <p:txBody>
           <a:bodyPr>
-            <a:normAutofit lnSpcReduction="10000"/>
+            <a:normAutofit/>
           </a:bodyPr>
           <a:lstStyle/>
           <a:p>
-            <a:pPr marL="0" indent="0">
+            <a:pPr marL="0" indent="0" algn="just">
               <a:buNone/>
             </a:pPr>
             <a:r>
@@ -8809,27 +8718,9 @@
             <a:endParaRPr lang="es-ES" sz="3200" dirty="0" smtClean="0"/>
           </a:p>
           <a:p>
-            <a:pPr marL="0" indent="0">
+            <a:pPr marL="0" indent="0" algn="just">
               <a:buNone/>
             </a:pPr>
-            <a:r>
-              <a:rPr lang="es-ES" sz="3200" dirty="0" smtClean="0"/>
-              <a:t>El </a:t>
-            </a:r>
-            <a:r>
-              <a:rPr lang="es-ES" sz="3200" dirty="0"/>
-              <a:t>sistema </a:t>
-            </a:r>
-            <a:r>
-              <a:rPr lang="es-ES" sz="3200" dirty="0" err="1"/>
-              <a:t>DeliverYApp</a:t>
-            </a:r>
-            <a:r>
-              <a:rPr lang="es-ES" sz="3200" dirty="0"/>
-              <a:t> será un producto diseñado para trabajar en entornos web, lo que permitirá su utilización de forma descentralizada, además trabajará de manera independiente por lo tanto no interactuará con otro sistemas.</a:t>
-            </a:r>
-          </a:p>
-          <a:p>
             <a:endParaRPr lang="es-ES" sz="3600" dirty="0"/>
           </a:p>
         </p:txBody>
@@ -8928,6 +8819,7 @@
             </a:lvl9pPr>
           </a:lstStyle>
           <a:p>
+            <a:pPr algn="ctr"/>
             <a:r>
               <a:rPr lang="es-ES" sz="5400" b="1" dirty="0" smtClean="0"/>
               <a:t>Descripción General</a:t>
@@ -9000,6 +8892,7 @@
           <a:bodyPr/>
           <a:lstStyle/>
           <a:p>
+            <a:pPr algn="ctr"/>
             <a:r>
               <a:rPr lang="es-ES" b="1" dirty="0"/>
               <a:t>Funciones del Producto</a:t>
@@ -9020,13 +8913,13 @@
         </p:nvSpPr>
         <p:spPr>
           <a:xfrm>
-            <a:off x="695460" y="1313645"/>
-            <a:ext cx="10805375" cy="5267459"/>
+            <a:off x="1880316" y="1468193"/>
+            <a:ext cx="8255357" cy="5267459"/>
           </a:xfrm>
         </p:spPr>
         <p:txBody>
           <a:bodyPr>
-            <a:normAutofit lnSpcReduction="10000"/>
+            <a:normAutofit/>
           </a:bodyPr>
           <a:lstStyle/>
           <a:p>
@@ -9058,71 +8951,83 @@
             </a:r>
             <a:r>
               <a:rPr lang="es-ES" b="1" dirty="0"/>
-              <a:t> - Empresa):</a:t>
-            </a:r>
-            <a:r>
-              <a:rPr lang="es-ES" dirty="0"/>
-              <a:t> Se le proveerá de un usuario y contraseña para que pueda acceder  y tener control de los servicios que provee el sistema. </a:t>
+              <a:t> - Empresa</a:t>
+            </a:r>
+            <a:r>
+              <a:rPr lang="es-ES" b="1" dirty="0" smtClean="0"/>
+              <a:t>)</a:t>
             </a:r>
             <a:endParaRPr lang="es-ES" dirty="0" smtClean="0"/>
           </a:p>
           <a:p>
+            <a:pPr lvl="0"/>
+            <a:r>
+              <a:rPr lang="es-ES" b="1" dirty="0" smtClean="0"/>
+              <a:t>Gestión </a:t>
+            </a:r>
             <a:r>
               <a:rPr lang="es-ES" b="1" dirty="0"/>
-              <a:t>Gestión de roles:</a:t>
-            </a:r>
-            <a:r>
-              <a:rPr lang="es-ES" dirty="0"/>
-              <a:t> Se especificará los niveles de accesos del sistema. </a:t>
-            </a:r>
+              <a:t>de </a:t>
+            </a:r>
+            <a:r>
+              <a:rPr lang="es-ES" b="1" dirty="0" smtClean="0"/>
+              <a:t>roles</a:t>
+            </a:r>
+            <a:endParaRPr lang="es-ES" dirty="0"/>
           </a:p>
           <a:p>
             <a:r>
               <a:rPr lang="es-ES" b="1" dirty="0"/>
-              <a:t>Gestión de usuario:</a:t>
-            </a:r>
-            <a:r>
-              <a:rPr lang="es-ES" dirty="0"/>
-              <a:t> Se crearan los diferentes usuarios del sistema indicando sus roles.</a:t>
-            </a:r>
-          </a:p>
-          <a:p>
+              <a:t>Gestión de </a:t>
+            </a:r>
+            <a:r>
+              <a:rPr lang="es-ES" b="1" dirty="0" smtClean="0"/>
+              <a:t>usuario</a:t>
+            </a:r>
+          </a:p>
+          <a:p>
+            <a:r>
+              <a:rPr lang="es-ES" b="1" dirty="0" smtClean="0"/>
+              <a:t>Gestión </a:t>
+            </a:r>
             <a:r>
               <a:rPr lang="es-ES" b="1" dirty="0"/>
-              <a:t>Gestión de menú:</a:t>
-            </a:r>
-            <a:r>
-              <a:rPr lang="es-ES" dirty="0"/>
-              <a:t> Este contendrá un formulario para el registro de los datos del producto, platos, precios, foto, etc.</a:t>
-            </a:r>
-          </a:p>
-          <a:p>
+              <a:t>de </a:t>
+            </a:r>
+            <a:r>
+              <a:rPr lang="es-ES" b="1" dirty="0" smtClean="0"/>
+              <a:t>menú</a:t>
+            </a:r>
+            <a:endParaRPr lang="es-ES" dirty="0" smtClean="0"/>
+          </a:p>
+          <a:p>
+            <a:r>
+              <a:rPr lang="es-ES" b="1" dirty="0" smtClean="0"/>
+              <a:t>Gestión </a:t>
+            </a:r>
             <a:r>
               <a:rPr lang="es-ES" b="1" dirty="0"/>
-              <a:t>Gestión de pedidos:</a:t>
-            </a:r>
-            <a:r>
-              <a:rPr lang="es-ES" dirty="0"/>
-              <a:t> Este contendrá opciones para manejar los estados de los pedidos</a:t>
-            </a:r>
-            <a:r>
-              <a:rPr lang="es-ES" dirty="0" smtClean="0"/>
-              <a:t>.</a:t>
-            </a:r>
-          </a:p>
-          <a:p>
+              <a:t>de </a:t>
+            </a:r>
+            <a:r>
+              <a:rPr lang="es-ES" b="1" dirty="0" smtClean="0"/>
+              <a:t>pedidos</a:t>
+            </a:r>
+          </a:p>
+          <a:p>
+            <a:r>
+              <a:rPr lang="es-ES" b="1" dirty="0" smtClean="0"/>
+              <a:t>Gestión </a:t>
+            </a:r>
             <a:r>
               <a:rPr lang="es-ES" b="1" dirty="0"/>
-              <a:t>Gestión de informes</a:t>
-            </a:r>
-            <a:r>
-              <a:rPr lang="es-ES" dirty="0"/>
-              <a:t>: Este contendrá opción para generar informes estadísticos</a:t>
-            </a:r>
-            <a:r>
-              <a:rPr lang="es-ES" dirty="0" smtClean="0"/>
-              <a:t>.</a:t>
-            </a:r>
+              <a:t>de </a:t>
+            </a:r>
+            <a:r>
+              <a:rPr lang="es-ES" b="1" dirty="0" smtClean="0"/>
+              <a:t>informes</a:t>
+            </a:r>
+            <a:endParaRPr lang="es-ES" dirty="0" smtClean="0"/>
           </a:p>
           <a:p>
             <a:pPr lvl="0"/>
@@ -9136,29 +9041,27 @@
             </a:r>
             <a:r>
               <a:rPr lang="es-ES" b="1" dirty="0"/>
-              <a:t> - cliente):</a:t>
-            </a:r>
-            <a:r>
-              <a:rPr lang="es-ES" dirty="0"/>
-              <a:t> El cliente deberá registrarse antes de solicitar el pedido.</a:t>
+              <a:t> - cliente</a:t>
+            </a:r>
+            <a:r>
+              <a:rPr lang="es-ES" b="1" dirty="0" smtClean="0"/>
+              <a:t>)</a:t>
             </a:r>
           </a:p>
           <a:p>
             <a:pPr lvl="0"/>
             <a:r>
+              <a:rPr lang="es-ES" b="1" dirty="0" smtClean="0"/>
+              <a:t>Elección </a:t>
+            </a:r>
+            <a:r>
               <a:rPr lang="es-ES" b="1" dirty="0"/>
-              <a:t>Elección y confirmación del pedido:</a:t>
-            </a:r>
-            <a:r>
-              <a:rPr lang="es-ES" dirty="0"/>
-              <a:t> Este contendrá opciones de elección de los diferentes tipos de platos que a su vez deberá ser confirmado.</a:t>
-            </a:r>
-          </a:p>
-          <a:p>
-            <a:endParaRPr lang="es-ES" dirty="0"/>
-          </a:p>
-          <a:p>
-            <a:pPr lvl="0"/>
+              <a:t>y confirmación del </a:t>
+            </a:r>
+            <a:r>
+              <a:rPr lang="es-ES" b="1" dirty="0" smtClean="0"/>
+              <a:t>pedido</a:t>
+            </a:r>
             <a:endParaRPr lang="es-ES" dirty="0"/>
           </a:p>
           <a:p>
@@ -9221,7 +9124,7 @@
         </p:nvSpPr>
         <p:spPr>
           <a:xfrm>
-            <a:off x="859595" y="958214"/>
+            <a:off x="705048" y="443060"/>
             <a:ext cx="9971538" cy="5197888"/>
           </a:xfrm>
         </p:spPr>
@@ -9229,48 +9132,83 @@
           <a:bodyPr/>
           <a:lstStyle/>
           <a:p>
-            <a:pPr marL="0" indent="0">
+            <a:pPr marL="0" indent="0" algn="ctr">
               <a:buNone/>
             </a:pPr>
             <a:r>
               <a:rPr lang="x-none" sz="3000" b="1" dirty="0"/>
-              <a:t>Características de los usuarios: </a:t>
-            </a:r>
-          </a:p>
-          <a:p>
-            <a:pPr lvl="0"/>
+              <a:t>Características de </a:t>
+            </a:r>
+            <a:r>
+              <a:rPr lang="x-none" sz="3000" b="1"/>
+              <a:t>los </a:t>
+            </a:r>
+            <a:r>
+              <a:rPr lang="x-none" sz="3000" b="1" smtClean="0"/>
+              <a:t>usuarios</a:t>
+            </a:r>
+            <a:endParaRPr lang="es-ES" sz="3000" b="1" dirty="0" smtClean="0"/>
+          </a:p>
+          <a:p>
+            <a:pPr marL="0" indent="0" algn="ctr">
+              <a:buNone/>
+            </a:pPr>
+            <a:endParaRPr lang="es-ES" sz="3000" b="1" dirty="0" smtClean="0"/>
+          </a:p>
+          <a:p>
+            <a:pPr marL="0" indent="0" algn="ctr">
+              <a:buNone/>
+            </a:pPr>
+            <a:endParaRPr lang="es-ES" sz="3000" b="1" dirty="0"/>
+          </a:p>
+          <a:p>
+            <a:pPr marL="0" indent="0" algn="ctr">
+              <a:buNone/>
+            </a:pPr>
+            <a:endParaRPr lang="es-ES" sz="3000" b="1" dirty="0" smtClean="0"/>
+          </a:p>
+          <a:p>
+            <a:pPr marL="0" indent="0" algn="ctr">
+              <a:buNone/>
+            </a:pPr>
+            <a:r>
+              <a:rPr lang="es-ES" b="1" dirty="0" smtClean="0"/>
+              <a:t>Administrador </a:t>
+            </a:r>
             <a:r>
               <a:rPr lang="es-ES" b="1" dirty="0"/>
-              <a:t>Administrador del sistema:</a:t>
-            </a:r>
-            <a:r>
-              <a:rPr lang="es-ES" dirty="0"/>
-              <a:t> usuario con gran conocimiento en el manejo del sistema, con una previa capacitación por parte de la entidad.</a:t>
-            </a:r>
-          </a:p>
-          <a:p>
-            <a:pPr lvl="0"/>
+              <a:t>del </a:t>
+            </a:r>
+            <a:r>
+              <a:rPr lang="es-ES" b="1" dirty="0" smtClean="0"/>
+              <a:t>sistema</a:t>
+            </a:r>
+          </a:p>
+          <a:p>
+            <a:pPr marL="0" indent="0" algn="ctr">
+              <a:buNone/>
+            </a:pPr>
+            <a:r>
+              <a:rPr lang="es-ES" b="1" dirty="0" smtClean="0"/>
+              <a:t>Usuario </a:t>
+            </a:r>
             <a:r>
               <a:rPr lang="es-ES" b="1" dirty="0"/>
-              <a:t>Usuario del sistema: </a:t>
-            </a:r>
-            <a:r>
-              <a:rPr lang="es-ES" dirty="0"/>
-              <a:t>es el encargado de gestionar los pedidos, con una previa capacitación por parte de la entidad.</a:t>
-            </a:r>
-          </a:p>
-          <a:p>
-            <a:pPr lvl="0"/>
-            <a:r>
-              <a:rPr lang="es-ES" b="1" dirty="0"/>
-              <a:t>Cliente:</a:t>
-            </a:r>
-            <a:r>
-              <a:rPr lang="es-ES" dirty="0"/>
-              <a:t> usuario visitante que solita los pedidos, debe contar con un conocimiento básico sobre el manejo de páginas web.</a:t>
-            </a:r>
-          </a:p>
-          <a:p>
+              <a:t>del </a:t>
+            </a:r>
+            <a:r>
+              <a:rPr lang="es-ES" b="1" dirty="0" smtClean="0"/>
+              <a:t>sistema</a:t>
+            </a:r>
+          </a:p>
+          <a:p>
+            <a:pPr marL="0" indent="0" algn="ctr">
+              <a:buNone/>
+            </a:pPr>
+            <a:r>
+              <a:rPr lang="es-ES" b="1" dirty="0" smtClean="0"/>
+              <a:t>Cliente</a:t>
+            </a:r>
             <a:endParaRPr lang="es-ES" dirty="0"/>
           </a:p>
         </p:txBody>
@@ -9327,6 +9265,7 @@
           <a:bodyPr/>
           <a:lstStyle/>
           <a:p>
+            <a:pPr algn="ctr"/>
             <a:r>
               <a:rPr lang="es-ES" dirty="0" smtClean="0"/>
               <a:t>Restricciones</a:t>
@@ -9347,8 +9286,8 @@
         </p:nvSpPr>
         <p:spPr>
           <a:xfrm>
-            <a:off x="308531" y="1254427"/>
-            <a:ext cx="11153667" cy="5391071"/>
+            <a:off x="1455314" y="1666552"/>
+            <a:ext cx="8564452" cy="4257730"/>
           </a:xfrm>
         </p:spPr>
         <p:txBody>
@@ -9360,109 +9299,83 @@
             <a:pPr lvl="0"/>
             <a:r>
               <a:rPr lang="es-ES" sz="1900" b="1" dirty="0"/>
-              <a:t>Políticas de la empresa:</a:t>
-            </a:r>
-            <a:r>
-              <a:rPr lang="es-ES" sz="1900" dirty="0"/>
-              <a:t> La aplicación se desarrollara mediante software de licencia abierta por lo tanto no se deberá pagar por el uso del servidor web(apache), sistema de gestión de base de datos (</a:t>
-            </a:r>
-            <a:r>
-              <a:rPr lang="es-ES" sz="1900" dirty="0" err="1"/>
-              <a:t>MySQL</a:t>
-            </a:r>
-            <a:r>
-              <a:rPr lang="es-ES" sz="1900" dirty="0"/>
-              <a:t>) y el lenguaje de programación </a:t>
-            </a:r>
-            <a:r>
-              <a:rPr lang="es-ES" sz="1900" dirty="0" err="1"/>
-              <a:t>RoR</a:t>
-            </a:r>
-            <a:r>
-              <a:rPr lang="es-ES" sz="1900" dirty="0"/>
-              <a:t>, por lo tanto la utilización de estos programas se harán mediantes las políticas establecidas por este tipo de licenciamiento</a:t>
-            </a:r>
-            <a:r>
-              <a:rPr lang="es-ES" sz="1900" dirty="0" smtClean="0"/>
-              <a:t>.</a:t>
-            </a:r>
+              <a:t>Políticas de la </a:t>
+            </a:r>
+            <a:r>
+              <a:rPr lang="es-ES" sz="1900" b="1" dirty="0" smtClean="0"/>
+              <a:t>empresa</a:t>
+            </a:r>
+            <a:endParaRPr lang="es-ES" sz="1900" dirty="0" smtClean="0"/>
           </a:p>
           <a:p>
             <a:r>
               <a:rPr lang="es-ES" sz="1900" b="1" dirty="0"/>
-              <a:t>Limitaciones del hardware:</a:t>
-            </a:r>
-            <a:r>
-              <a:rPr lang="es-ES" sz="1900" dirty="0"/>
-              <a:t> para esta aplicación será necesaria un computador servidor en el cual se instalara el servidor web apache, </a:t>
-            </a:r>
-            <a:r>
-              <a:rPr lang="es-ES" sz="1900" dirty="0" err="1"/>
-              <a:t>MySQl</a:t>
-            </a:r>
-            <a:r>
-              <a:rPr lang="es-ES" sz="1900" dirty="0"/>
-              <a:t>, </a:t>
-            </a:r>
-            <a:r>
-              <a:rPr lang="es-ES" sz="1900" dirty="0" err="1"/>
-              <a:t>RoR</a:t>
-            </a:r>
-            <a:r>
-              <a:rPr lang="es-ES" sz="1900" dirty="0"/>
-              <a:t> y la aplicación </a:t>
-            </a:r>
-            <a:r>
-              <a:rPr lang="es-ES" sz="1900" dirty="0" err="1"/>
-              <a:t>DeliverYApp</a:t>
-            </a:r>
-            <a:r>
-              <a:rPr lang="es-ES" sz="1900" dirty="0"/>
-              <a:t>.</a:t>
-            </a:r>
-          </a:p>
-          <a:p>
+              <a:t>Limitaciones del </a:t>
+            </a:r>
+            <a:r>
+              <a:rPr lang="es-ES" sz="1900" b="1" dirty="0" smtClean="0"/>
+              <a:t>hardware</a:t>
+            </a:r>
+          </a:p>
+          <a:p>
+            <a:r>
+              <a:rPr lang="es-ES" sz="1900" b="1" dirty="0" smtClean="0"/>
+              <a:t>Interfaces </a:t>
+            </a:r>
             <a:r>
               <a:rPr lang="es-ES" sz="1900" b="1" dirty="0"/>
-              <a:t>Interfaces con otras aplicaciones:</a:t>
-            </a:r>
-            <a:r>
-              <a:rPr lang="es-ES" sz="1900" dirty="0"/>
-              <a:t> Debido a que el sistema no interactúa con otro sistema y es autónomo no se desarrollaran interfaces con otras aplicaciones. Las conexiones necesarias para la utilización del servidor web, </a:t>
-            </a:r>
-            <a:r>
-              <a:rPr lang="es-ES" sz="1900" dirty="0" err="1"/>
-              <a:t>MySQL</a:t>
-            </a:r>
-            <a:r>
-              <a:rPr lang="es-ES" sz="1900" dirty="0"/>
-              <a:t>, </a:t>
-            </a:r>
-            <a:r>
-              <a:rPr lang="es-ES" sz="1900" dirty="0" err="1"/>
-              <a:t>RoR</a:t>
-            </a:r>
-            <a:r>
-              <a:rPr lang="es-ES" sz="1900" dirty="0"/>
-              <a:t> y un DNS será por medio de la configuración de estos programas.</a:t>
-            </a:r>
-          </a:p>
-          <a:p>
-            <a:r>
-              <a:rPr lang="es-ES" sz="1900" b="1" dirty="0"/>
-              <a:t>Funciones de control:</a:t>
-            </a:r>
-            <a:r>
-              <a:rPr lang="es-ES" sz="1900" dirty="0"/>
-              <a:t> El sistema debe controlar los permisos que tiene los usuarios para su accesibilidad de una manera correcta, de tal forma que pueda acceder la información que le corresponde de acuerdo a su rol. Debe tener controles adecuados para la validación de datos</a:t>
-            </a:r>
-            <a:r>
-              <a:rPr lang="es-ES" sz="1900" dirty="0" smtClean="0"/>
-              <a:t>.</a:t>
+              <a:t>con otras </a:t>
+            </a:r>
+            <a:r>
+              <a:rPr lang="es-ES" sz="1900" b="1" dirty="0" smtClean="0"/>
+              <a:t>aplicaciones</a:t>
             </a:r>
           </a:p>
           <a:p>
             <a:pPr lvl="0"/>
+            <a:r>
+              <a:rPr lang="es-ES" sz="1900" b="1" dirty="0" smtClean="0"/>
+              <a:t>Funciones de control </a:t>
+            </a:r>
+          </a:p>
+          <a:p>
+            <a:pPr lvl="0"/>
+            <a:r>
+              <a:rPr lang="es-ES" b="1" dirty="0" smtClean="0"/>
+              <a:t>Lenguaje </a:t>
+            </a:r>
+            <a:r>
+              <a:rPr lang="es-ES" b="1" dirty="0"/>
+              <a:t>de programación</a:t>
+            </a:r>
+          </a:p>
+          <a:p>
+            <a:pPr lvl="0"/>
+            <a:r>
+              <a:rPr lang="es-ES" b="1" dirty="0"/>
+              <a:t>Protocolo de comunicación</a:t>
+            </a:r>
+          </a:p>
+          <a:p>
+            <a:pPr lvl="0"/>
+            <a:r>
+              <a:rPr lang="es-ES" b="1" dirty="0"/>
+              <a:t>Requisitos de habilidad</a:t>
+            </a:r>
+          </a:p>
+          <a:p>
+            <a:pPr lvl="0"/>
+            <a:r>
+              <a:rPr lang="es-ES" b="1" dirty="0"/>
+              <a:t>Credibilidad en la aplicación</a:t>
+            </a:r>
+          </a:p>
+          <a:p>
+            <a:pPr lvl="0"/>
+            <a:r>
+              <a:rPr lang="es-ES" b="1" dirty="0"/>
+              <a:t>Consideración acerca de la seguridad</a:t>
+            </a:r>
             <a:endParaRPr lang="es-ES" dirty="0"/>
           </a:p>
           <a:p>
@@ -9750,7 +9663,7 @@
   <a:extraClrSchemeLst/>
   <a:extLst>
     <a:ext uri="{05A4C25C-085E-4340-85A3-A5531E510DB2}">
-      <thm15:themeFamily xmlns:thm15="http://schemas.microsoft.com/office/thememl/2012/main" name="Ion" id="{B8441ADB-2E43-4AF7-B97A-BD870242C6A8}" vid="{292E63A9-BB86-4E3D-B92A-7223C6510D2E}"/>
+      <thm15:themeFamily xmlns:thm15="http://schemas.microsoft.com/office/thememl/2012/main" xmlns="" name="Ion" id="{B8441ADB-2E43-4AF7-B97A-BD870242C6A8}" vid="{292E63A9-BB86-4E3D-B92A-7223C6510D2E}"/>
     </a:ext>
   </a:extLst>
 </a:theme>

</xml_diff>